<commit_message>
fix: Updated template enginge iconhttps://github.com/hlfshell/node.jSTL-Intro-Series---An-Introduction-to-Expresss
</commit_message>
<xml_diff>
--- a/nodejs intro to express.pptx
+++ b/nodejs intro to express.pptx
@@ -9,8 +9,8 @@
   </p:notesMasterIdLst>
   <p:sldIdLst>
     <p:sldId id="256" r:id="rId2"/>
-    <p:sldId id="258" r:id="rId3"/>
-    <p:sldId id="257" r:id="rId4"/>
+    <p:sldId id="257" r:id="rId3"/>
+    <p:sldId id="258" r:id="rId4"/>
     <p:sldId id="259" r:id="rId5"/>
     <p:sldId id="268" r:id="rId6"/>
     <p:sldId id="269" r:id="rId7"/>
@@ -6053,39 +6053,8 @@
         </p:nvSpPr>
         <p:spPr/>
         <p:txBody>
-          <a:bodyPr/>
-          <a:lstStyle/>
-          <a:p>
-            <a:r>
-              <a:rPr lang="en-US" dirty="0" smtClean="0">
-                <a:solidFill>
-                  <a:schemeClr val="bg1"/>
-                </a:solidFill>
-              </a:rPr>
-              <a:t>Who the heck am I</a:t>
-            </a:r>
-            <a:endParaRPr lang="en-US" dirty="0">
-              <a:solidFill>
-                <a:schemeClr val="bg1"/>
-              </a:solidFill>
-            </a:endParaRPr>
-          </a:p>
-        </p:txBody>
-      </p:sp>
-      <p:sp>
-        <p:nvSpPr>
-          <p:cNvPr id="3" name="Subtitle 2"/>
-          <p:cNvSpPr>
-            <a:spLocks noGrp="1"/>
-          </p:cNvSpPr>
-          <p:nvPr>
-            <p:ph idx="1"/>
-          </p:nvPr>
-        </p:nvSpPr>
-        <p:spPr/>
-        <p:txBody>
           <a:bodyPr>
-            <a:noAutofit/>
+            <a:normAutofit fontScale="90000"/>
           </a:bodyPr>
           <a:lstStyle/>
           <a:p>
@@ -6095,187 +6064,8 @@
                   <a:schemeClr val="bg1"/>
                 </a:solidFill>
               </a:rPr>
-              <a:t>Head of Research and Development + and an Application Developer at</a:t>
-            </a:r>
-          </a:p>
-          <a:p>
-            <a:endParaRPr lang="en-US" dirty="0">
-              <a:solidFill>
-                <a:schemeClr val="bg1"/>
-              </a:solidFill>
-            </a:endParaRPr>
-          </a:p>
-          <a:p>
-            <a:r>
-              <a:rPr lang="en-US" dirty="0" smtClean="0">
-                <a:solidFill>
-                  <a:schemeClr val="bg1"/>
-                </a:solidFill>
-              </a:rPr>
-              <a:t>I use node.js everyday for websites, tablet </a:t>
-            </a:r>
-            <a:r>
-              <a:rPr lang="en-US" sz="2800" dirty="0" smtClean="0">
-                <a:solidFill>
-                  <a:schemeClr val="bg1"/>
-                </a:solidFill>
-              </a:rPr>
-              <a:t>apps, robots, hardware control, heart rate </a:t>
-            </a:r>
-            <a:r>
-              <a:rPr lang="en-US" sz="2400" dirty="0" smtClean="0">
-                <a:solidFill>
-                  <a:schemeClr val="bg1"/>
-                </a:solidFill>
-              </a:rPr>
-              <a:t>monitoring, light control, sound effects, beer measuring, nerf wars, video </a:t>
-            </a:r>
-            <a:r>
-              <a:rPr lang="en-US" sz="2000" dirty="0" smtClean="0">
-                <a:solidFill>
-                  <a:schemeClr val="bg1"/>
-                </a:solidFill>
-              </a:rPr>
-              <a:t>games, computer vision,</a:t>
-            </a:r>
-            <a:r>
-              <a:rPr lang="en-US" sz="2400" dirty="0" smtClean="0">
-                <a:solidFill>
-                  <a:schemeClr val="bg1"/>
-                </a:solidFill>
-              </a:rPr>
-              <a:t> </a:t>
-            </a:r>
-            <a:r>
-              <a:rPr lang="en-US" sz="2000" dirty="0" smtClean="0">
-                <a:solidFill>
-                  <a:schemeClr val="bg1"/>
-                </a:solidFill>
-              </a:rPr>
-              <a:t>augmented reality, image manipulation, home </a:t>
-            </a:r>
-            <a:r>
-              <a:rPr lang="en-US" sz="1800" dirty="0" smtClean="0">
-                <a:solidFill>
-                  <a:schemeClr val="bg1"/>
-                </a:solidFill>
-              </a:rPr>
-              <a:t>automation, </a:t>
-            </a:r>
-            <a:r>
-              <a:rPr lang="en-US" sz="1800" dirty="0" err="1" smtClean="0">
-                <a:solidFill>
-                  <a:schemeClr val="bg1"/>
-                </a:solidFill>
-              </a:rPr>
-              <a:t>wifi</a:t>
-            </a:r>
-            <a:r>
-              <a:rPr lang="en-US" sz="1800" dirty="0" smtClean="0">
-                <a:solidFill>
-                  <a:schemeClr val="bg1"/>
-                </a:solidFill>
-              </a:rPr>
-              <a:t> tracking, </a:t>
-            </a:r>
-            <a:r>
-              <a:rPr lang="en-US" sz="1800" dirty="0" err="1" smtClean="0">
-                <a:solidFill>
-                  <a:schemeClr val="bg1"/>
-                </a:solidFill>
-              </a:rPr>
-              <a:t>microservices</a:t>
-            </a:r>
-            <a:r>
-              <a:rPr lang="en-US" sz="1800" dirty="0" smtClean="0">
-                <a:solidFill>
-                  <a:schemeClr val="bg1"/>
-                </a:solidFill>
-              </a:rPr>
-              <a:t>, e-mail handling,</a:t>
-            </a:r>
-            <a:r>
-              <a:rPr lang="en-US" sz="2000" dirty="0" smtClean="0">
-                <a:solidFill>
-                  <a:schemeClr val="bg1"/>
-                </a:solidFill>
-              </a:rPr>
-              <a:t> </a:t>
-            </a:r>
-            <a:r>
-              <a:rPr lang="en-US" sz="1800" dirty="0" smtClean="0">
-                <a:solidFill>
-                  <a:schemeClr val="bg1"/>
-                </a:solidFill>
-              </a:rPr>
-              <a:t>chat bots, artificial </a:t>
-            </a:r>
-            <a:r>
-              <a:rPr lang="en-US" sz="1600" dirty="0" smtClean="0">
-                <a:solidFill>
-                  <a:schemeClr val="bg1"/>
-                </a:solidFill>
-              </a:rPr>
-              <a:t>intelligence, streaming video,  big data, drink mixing (really), beach selfies, bit torrent, </a:t>
-            </a:r>
-            <a:r>
-              <a:rPr lang="en-US" sz="1400" dirty="0" err="1" smtClean="0">
-                <a:solidFill>
-                  <a:schemeClr val="bg1"/>
-                </a:solidFill>
-              </a:rPr>
-              <a:t>blockchain</a:t>
-            </a:r>
-            <a:r>
-              <a:rPr lang="en-US" sz="1400" dirty="0" smtClean="0">
-                <a:solidFill>
-                  <a:schemeClr val="bg1"/>
-                </a:solidFill>
-              </a:rPr>
-              <a:t>, distributed networking, mesh radio networking</a:t>
-            </a:r>
-            <a:r>
-              <a:rPr lang="en-US" sz="1400" smtClean="0">
-                <a:solidFill>
-                  <a:schemeClr val="bg1"/>
-                </a:solidFill>
-              </a:rPr>
-              <a:t>, permanent </a:t>
-            </a:r>
-            <a:r>
-              <a:rPr lang="en-US" sz="1400" dirty="0" smtClean="0">
-                <a:solidFill>
-                  <a:schemeClr val="bg1"/>
-                </a:solidFill>
-              </a:rPr>
-              <a:t>web…</a:t>
-            </a:r>
-            <a:endParaRPr lang="en-US" sz="1600" dirty="0" smtClean="0">
-              <a:solidFill>
-                <a:schemeClr val="bg1"/>
-              </a:solidFill>
-            </a:endParaRPr>
-          </a:p>
-          <a:p>
-            <a:pPr marL="0" indent="0" algn="ctr">
-              <a:buNone/>
-            </a:pPr>
-            <a:r>
-              <a:rPr lang="en-US" i="1" dirty="0" smtClean="0">
-                <a:solidFill>
-                  <a:schemeClr val="bg1"/>
-                </a:solidFill>
-              </a:rPr>
-              <a:t>and much more</a:t>
-            </a:r>
-            <a:endParaRPr lang="en-US" sz="4800" i="1" dirty="0" smtClean="0">
-              <a:solidFill>
-                <a:schemeClr val="bg1"/>
-              </a:solidFill>
-            </a:endParaRPr>
-          </a:p>
-          <a:p>
-            <a:pPr lvl="1"/>
+              <a:t>Welcome to the                 community</a:t>
+            </a:r>
             <a:endParaRPr lang="en-US" dirty="0">
               <a:solidFill>
                 <a:schemeClr val="bg1"/>
@@ -6316,92 +6106,273 @@
       </p:pic>
       <p:sp>
         <p:nvSpPr>
-          <p:cNvPr id="4" name="AutoShape 2" descr="http://blog.thisisfusion.com/wp-content/themes/thisIsFusion/library/images/logo.svg"/>
-          <p:cNvSpPr>
-            <a:spLocks noChangeAspect="1" noChangeArrowheads="1"/>
-          </p:cNvSpPr>
-          <p:nvPr/>
-        </p:nvSpPr>
-        <p:spPr bwMode="auto">
-          <a:xfrm>
-            <a:off x="155575" y="-144463"/>
-            <a:ext cx="304800" cy="304801"/>
-          </a:xfrm>
-          <a:prstGeom prst="rect">
-            <a:avLst/>
-          </a:prstGeom>
-          <a:noFill/>
-          <a:extLst>
-            <a:ext uri="{909E8E84-426E-40DD-AFC4-6F175D3DCCD1}">
-              <a14:hiddenFill xmlns:a14="http://schemas.microsoft.com/office/drawing/2010/main">
-                <a:solidFill>
-                  <a:srgbClr val="FFFFFF"/>
-                </a:solidFill>
-              </a14:hiddenFill>
-            </a:ext>
-          </a:extLst>
-        </p:spPr>
-        <p:txBody>
-          <a:bodyPr vert="horz" wrap="square" lIns="91440" tIns="45720" rIns="91440" bIns="45720" numCol="1" anchor="t" anchorCtr="0" compatLnSpc="1">
-            <a:prstTxWarp prst="textNoShape">
-              <a:avLst/>
-            </a:prstTxWarp>
+          <p:cNvPr id="2" name="Content Placeholder 1"/>
+          <p:cNvSpPr>
+            <a:spLocks noGrp="1"/>
+          </p:cNvSpPr>
+          <p:nvPr>
+            <p:ph idx="1"/>
+          </p:nvPr>
+        </p:nvSpPr>
+        <p:spPr/>
+        <p:txBody>
+          <a:bodyPr>
+            <a:normAutofit fontScale="62500" lnSpcReduction="20000"/>
           </a:bodyPr>
           <a:lstStyle/>
           <a:p>
-            <a:endParaRPr lang="en-US"/>
-          </a:p>
-        </p:txBody>
-      </p:sp>
-      <p:sp>
-        <p:nvSpPr>
-          <p:cNvPr id="6" name="AutoShape 4" descr="http://blog.thisisfusion.com/wp-content/themes/thisIsFusion/library/images/logo.svg"/>
-          <p:cNvSpPr>
-            <a:spLocks noChangeAspect="1" noChangeArrowheads="1"/>
-          </p:cNvSpPr>
-          <p:nvPr/>
-        </p:nvSpPr>
-        <p:spPr bwMode="auto">
-          <a:xfrm>
-            <a:off x="307975" y="7937"/>
-            <a:ext cx="304800" cy="304801"/>
-          </a:xfrm>
-          <a:prstGeom prst="rect">
-            <a:avLst/>
-          </a:prstGeom>
-          <a:noFill/>
-          <a:extLst>
-            <a:ext uri="{909E8E84-426E-40DD-AFC4-6F175D3DCCD1}">
-              <a14:hiddenFill xmlns:a14="http://schemas.microsoft.com/office/drawing/2010/main">
-                <a:solidFill>
-                  <a:srgbClr val="FFFFFF"/>
-                </a:solidFill>
-              </a14:hiddenFill>
-            </a:ext>
-          </a:extLst>
-        </p:spPr>
-        <p:txBody>
-          <a:bodyPr vert="horz" wrap="square" lIns="91440" tIns="45720" rIns="91440" bIns="45720" numCol="1" anchor="t" anchorCtr="0" compatLnSpc="1">
-            <a:prstTxWarp prst="textNoShape">
-              <a:avLst/>
-            </a:prstTxWarp>
-          </a:bodyPr>
-          <a:lstStyle/>
-          <a:p>
-            <a:endParaRPr lang="en-US"/>
+            <a:r>
+              <a:rPr lang="en-US" dirty="0" err="1" smtClean="0">
+                <a:solidFill>
+                  <a:schemeClr val="bg1"/>
+                </a:solidFill>
+              </a:rPr>
+              <a:t>node.jSTL</a:t>
+            </a:r>
+            <a:r>
+              <a:rPr lang="en-US" dirty="0" smtClean="0">
+                <a:solidFill>
+                  <a:schemeClr val="bg1"/>
+                </a:solidFill>
+              </a:rPr>
+              <a:t> meets at least once a month</a:t>
+            </a:r>
+          </a:p>
+          <a:p>
+            <a:pPr lvl="1"/>
+            <a:r>
+              <a:rPr lang="en-US" dirty="0" smtClean="0">
+                <a:solidFill>
+                  <a:schemeClr val="bg1"/>
+                </a:solidFill>
+              </a:rPr>
+              <a:t>We try to make talks good for experts </a:t>
+            </a:r>
+            <a:r>
+              <a:rPr lang="en-US" i="1" dirty="0" smtClean="0">
+                <a:solidFill>
+                  <a:schemeClr val="bg1"/>
+                </a:solidFill>
+              </a:rPr>
+              <a:t>and</a:t>
+            </a:r>
+            <a:r>
+              <a:rPr lang="en-US" dirty="0" smtClean="0">
+                <a:solidFill>
+                  <a:schemeClr val="bg1"/>
+                </a:solidFill>
+              </a:rPr>
+              <a:t> beginners</a:t>
+            </a:r>
+          </a:p>
+          <a:p>
+            <a:pPr lvl="1"/>
+            <a:r>
+              <a:rPr lang="en-US" dirty="0" smtClean="0">
+                <a:solidFill>
+                  <a:schemeClr val="bg1"/>
+                </a:solidFill>
+              </a:rPr>
+              <a:t>Open floor time to talk to experts, ask for help on projects, get resources to learn</a:t>
+            </a:r>
+          </a:p>
+          <a:p>
+            <a:pPr lvl="1"/>
+            <a:r>
+              <a:rPr lang="en-US" dirty="0" smtClean="0">
+                <a:solidFill>
+                  <a:schemeClr val="bg1"/>
+                </a:solidFill>
+              </a:rPr>
+              <a:t>“Classes” like this is new, and we’d like your feedback to have more</a:t>
+            </a:r>
+          </a:p>
+          <a:p>
+            <a:pPr lvl="1"/>
+            <a:endParaRPr lang="en-US" dirty="0">
+              <a:solidFill>
+                <a:schemeClr val="bg1"/>
+              </a:solidFill>
+            </a:endParaRPr>
+          </a:p>
+          <a:p>
+            <a:r>
+              <a:rPr lang="en-US" dirty="0" err="1" smtClean="0">
+                <a:solidFill>
+                  <a:schemeClr val="bg1"/>
+                </a:solidFill>
+              </a:rPr>
+              <a:t>jSTL</a:t>
+            </a:r>
+            <a:r>
+              <a:rPr lang="en-US" dirty="0" smtClean="0">
+                <a:solidFill>
+                  <a:schemeClr val="bg1"/>
+                </a:solidFill>
+              </a:rPr>
+              <a:t> coming soon!</a:t>
+            </a:r>
+          </a:p>
+          <a:p>
+            <a:pPr lvl="1"/>
+            <a:r>
+              <a:rPr lang="en-US" dirty="0" smtClean="0">
+                <a:solidFill>
+                  <a:schemeClr val="bg1"/>
+                </a:solidFill>
+              </a:rPr>
+              <a:t>General </a:t>
+            </a:r>
+            <a:r>
+              <a:rPr lang="en-US" dirty="0" err="1" smtClean="0">
+                <a:solidFill>
+                  <a:schemeClr val="bg1"/>
+                </a:solidFill>
+              </a:rPr>
+              <a:t>Javascript</a:t>
+            </a:r>
+            <a:r>
+              <a:rPr lang="en-US" dirty="0" smtClean="0">
+                <a:solidFill>
+                  <a:schemeClr val="bg1"/>
+                </a:solidFill>
+              </a:rPr>
+              <a:t> meetup to incorporate ALL front end frameworks + node</a:t>
+            </a:r>
+          </a:p>
+          <a:p>
+            <a:pPr lvl="1"/>
+            <a:r>
+              <a:rPr lang="en-US" dirty="0" smtClean="0">
+                <a:solidFill>
+                  <a:schemeClr val="bg1"/>
+                </a:solidFill>
+              </a:rPr>
+              <a:t>Work in progress</a:t>
+            </a:r>
+          </a:p>
+          <a:p>
+            <a:endParaRPr lang="en-US" dirty="0">
+              <a:solidFill>
+                <a:schemeClr val="bg1"/>
+              </a:solidFill>
+            </a:endParaRPr>
+          </a:p>
+          <a:p>
+            <a:r>
+              <a:rPr lang="en-US" dirty="0" smtClean="0">
+                <a:solidFill>
+                  <a:schemeClr val="bg1"/>
+                </a:solidFill>
+              </a:rPr>
+              <a:t>Join STL-Tech slack</a:t>
+            </a:r>
+            <a:r>
+              <a:rPr lang="en-US" dirty="0">
+                <a:solidFill>
+                  <a:schemeClr val="bg1"/>
+                </a:solidFill>
+              </a:rPr>
+              <a:t>! </a:t>
+            </a:r>
+            <a:r>
+              <a:rPr lang="en-US" i="1" dirty="0" smtClean="0">
+                <a:solidFill>
+                  <a:schemeClr val="accent1">
+                    <a:lumMod val="40000"/>
+                    <a:lumOff val="60000"/>
+                  </a:schemeClr>
+                </a:solidFill>
+              </a:rPr>
+              <a:t>stltech.herokuapp.com </a:t>
+            </a:r>
+            <a:r>
+              <a:rPr lang="en-US" dirty="0" smtClean="0">
+                <a:solidFill>
+                  <a:schemeClr val="bg1"/>
+                </a:solidFill>
+              </a:rPr>
+              <a:t>to get an invite</a:t>
+            </a:r>
+          </a:p>
+          <a:p>
+            <a:endParaRPr lang="en-US" i="1" dirty="0">
+              <a:solidFill>
+                <a:schemeClr val="bg1"/>
+              </a:solidFill>
+            </a:endParaRPr>
+          </a:p>
+          <a:p>
+            <a:r>
+              <a:rPr lang="en-US" i="1" dirty="0" smtClean="0">
+                <a:solidFill>
+                  <a:schemeClr val="bg1"/>
+                </a:solidFill>
+              </a:rPr>
+              <a:t>#node</a:t>
+            </a:r>
+            <a:r>
+              <a:rPr lang="en-US" dirty="0" smtClean="0">
+                <a:solidFill>
+                  <a:schemeClr val="bg1"/>
+                </a:solidFill>
+              </a:rPr>
+              <a:t> channel Is connected to other slack groups around the world</a:t>
+            </a:r>
+          </a:p>
+          <a:p>
+            <a:endParaRPr lang="en-US" dirty="0">
+              <a:solidFill>
+                <a:schemeClr val="bg1"/>
+              </a:solidFill>
+            </a:endParaRPr>
+          </a:p>
+          <a:p>
+            <a:r>
+              <a:rPr lang="en-US" dirty="0" smtClean="0">
+                <a:solidFill>
+                  <a:schemeClr val="bg1"/>
+                </a:solidFill>
+              </a:rPr>
+              <a:t>@</a:t>
+            </a:r>
+            <a:r>
+              <a:rPr lang="en-US" dirty="0" err="1" smtClean="0">
+                <a:solidFill>
+                  <a:schemeClr val="bg1"/>
+                </a:solidFill>
+              </a:rPr>
+              <a:t>keithchester</a:t>
+            </a:r>
+            <a:r>
+              <a:rPr lang="en-US" dirty="0" smtClean="0">
+                <a:solidFill>
+                  <a:schemeClr val="bg1"/>
+                </a:solidFill>
+              </a:rPr>
+              <a:t> is my username there</a:t>
+            </a:r>
+            <a:endParaRPr lang="en-US" dirty="0" smtClean="0">
+              <a:solidFill>
+                <a:schemeClr val="accent1">
+                  <a:lumMod val="40000"/>
+                  <a:lumOff val="60000"/>
+                </a:schemeClr>
+              </a:solidFill>
+            </a:endParaRPr>
           </a:p>
         </p:txBody>
       </p:sp>
       <p:pic>
         <p:nvPicPr>
-          <p:cNvPr id="7" name="Picture 6"/>
+          <p:cNvPr id="9" name="Picture 8"/>
           <p:cNvPicPr>
             <a:picLocks noChangeAspect="1"/>
           </p:cNvPicPr>
           <p:nvPr/>
         </p:nvPicPr>
         <p:blipFill>
-          <a:blip r:embed="rId3" cstate="print">
+          <a:blip r:embed="rId2">
             <a:extLst>
               <a:ext uri="{28A0092B-C50C-407E-A947-70E740481C1C}">
                 <a14:useLocalDpi xmlns:a14="http://schemas.microsoft.com/office/drawing/2010/main" val="0"/>
@@ -6414,8 +6385,8 @@
         </p:blipFill>
         <p:spPr>
           <a:xfrm>
-            <a:off x="5045813" y="2209800"/>
-            <a:ext cx="685800" cy="613730"/>
+            <a:off x="4267200" y="533400"/>
+            <a:ext cx="1644363" cy="685800"/>
           </a:xfrm>
           <a:prstGeom prst="rect">
             <a:avLst/>
@@ -6425,7 +6396,7 @@
     </p:spTree>
     <p:extLst>
       <p:ext uri="{BB962C8B-B14F-4D97-AF65-F5344CB8AC3E}">
-        <p14:creationId xmlns:p14="http://schemas.microsoft.com/office/powerpoint/2010/main" val="698550408"/>
+        <p14:creationId xmlns:p14="http://schemas.microsoft.com/office/powerpoint/2010/main" val="2060994605"/>
       </p:ext>
     </p:extLst>
   </p:cSld>
@@ -7263,6 +7234,248 @@
           <a:prstGeom prst="rect">
             <a:avLst/>
           </a:prstGeom>
+        </p:spPr>
+      </p:pic>
+      <p:sp>
+        <p:nvSpPr>
+          <p:cNvPr id="2" name="AutoShape 2" descr="https://camo.githubusercontent.com/a43de8ca816e78b1c2666f7696f449b2eeddbeca/68747470733a2f2f63646e2e7261776769742e636f6d2f7075676a732f7075672d6c6f676f2f656563343336636565386664396431373236643738333963626539396431663639343639326330632f5356472f7075672d66696e616c2d6c6f676f2d5f2d636f6c6f75722d3132382e737667"/>
+          <p:cNvSpPr>
+            <a:spLocks noChangeAspect="1" noChangeArrowheads="1"/>
+          </p:cNvSpPr>
+          <p:nvPr/>
+        </p:nvSpPr>
+        <p:spPr bwMode="auto">
+          <a:xfrm>
+            <a:off x="155575" y="-144463"/>
+            <a:ext cx="304800" cy="304801"/>
+          </a:xfrm>
+          <a:prstGeom prst="rect">
+            <a:avLst/>
+          </a:prstGeom>
+          <a:noFill/>
+          <a:extLst>
+            <a:ext uri="{909E8E84-426E-40DD-AFC4-6F175D3DCCD1}">
+              <a14:hiddenFill xmlns:a14="http://schemas.microsoft.com/office/drawing/2010/main">
+                <a:solidFill>
+                  <a:srgbClr val="FFFFFF"/>
+                </a:solidFill>
+              </a14:hiddenFill>
+            </a:ext>
+          </a:extLst>
+        </p:spPr>
+        <p:txBody>
+          <a:bodyPr vert="horz" wrap="square" lIns="91440" tIns="45720" rIns="91440" bIns="45720" numCol="1" anchor="t" anchorCtr="0" compatLnSpc="1">
+            <a:prstTxWarp prst="textNoShape">
+              <a:avLst/>
+            </a:prstTxWarp>
+          </a:bodyPr>
+          <a:lstStyle/>
+          <a:p>
+            <a:endParaRPr lang="en-US"/>
+          </a:p>
+        </p:txBody>
+      </p:sp>
+      <p:sp>
+        <p:nvSpPr>
+          <p:cNvPr id="3" name="AutoShape 4" descr="https://camo.githubusercontent.com/a43de8ca816e78b1c2666f7696f449b2eeddbeca/68747470733a2f2f63646e2e7261776769742e636f6d2f7075676a732f7075672d6c6f676f2f656563343336636565386664396431373236643738333963626539396431663639343639326330632f5356472f7075672d66696e616c2d6c6f676f2d5f2d636f6c6f75722d3132382e737667"/>
+          <p:cNvSpPr>
+            <a:spLocks noChangeAspect="1" noChangeArrowheads="1"/>
+          </p:cNvSpPr>
+          <p:nvPr/>
+        </p:nvSpPr>
+        <p:spPr bwMode="auto">
+          <a:xfrm>
+            <a:off x="307975" y="7937"/>
+            <a:ext cx="304800" cy="304801"/>
+          </a:xfrm>
+          <a:prstGeom prst="rect">
+            <a:avLst/>
+          </a:prstGeom>
+          <a:noFill/>
+          <a:extLst>
+            <a:ext uri="{909E8E84-426E-40DD-AFC4-6F175D3DCCD1}">
+              <a14:hiddenFill xmlns:a14="http://schemas.microsoft.com/office/drawing/2010/main">
+                <a:solidFill>
+                  <a:srgbClr val="FFFFFF"/>
+                </a:solidFill>
+              </a14:hiddenFill>
+            </a:ext>
+          </a:extLst>
+        </p:spPr>
+        <p:txBody>
+          <a:bodyPr vert="horz" wrap="square" lIns="91440" tIns="45720" rIns="91440" bIns="45720" numCol="1" anchor="t" anchorCtr="0" compatLnSpc="1">
+            <a:prstTxWarp prst="textNoShape">
+              <a:avLst/>
+            </a:prstTxWarp>
+          </a:bodyPr>
+          <a:lstStyle/>
+          <a:p>
+            <a:endParaRPr lang="en-US"/>
+          </a:p>
+        </p:txBody>
+      </p:sp>
+      <p:pic>
+        <p:nvPicPr>
+          <p:cNvPr id="1030" name="Picture 6" descr="Image result for pugjs"/>
+          <p:cNvPicPr>
+            <a:picLocks noChangeAspect="1" noChangeArrowheads="1"/>
+          </p:cNvPicPr>
+          <p:nvPr/>
+        </p:nvPicPr>
+        <p:blipFill>
+          <a:blip r:embed="rId3" cstate="print">
+            <a:extLst>
+              <a:ext uri="{28A0092B-C50C-407E-A947-70E740481C1C}">
+                <a14:useLocalDpi xmlns:a14="http://schemas.microsoft.com/office/drawing/2010/main" val="0"/>
+              </a:ext>
+            </a:extLst>
+          </a:blip>
+          <a:srcRect/>
+          <a:stretch>
+            <a:fillRect/>
+          </a:stretch>
+        </p:blipFill>
+        <p:spPr bwMode="auto">
+          <a:xfrm>
+            <a:off x="6400800" y="2283552"/>
+            <a:ext cx="2136611" cy="2136611"/>
+          </a:xfrm>
+          <a:prstGeom prst="rect">
+            <a:avLst/>
+          </a:prstGeom>
+          <a:noFill/>
+          <a:extLst>
+            <a:ext uri="{909E8E84-426E-40DD-AFC4-6F175D3DCCD1}">
+              <a14:hiddenFill xmlns:a14="http://schemas.microsoft.com/office/drawing/2010/main">
+                <a:solidFill>
+                  <a:srgbClr val="FFFFFF"/>
+                </a:solidFill>
+              </a14:hiddenFill>
+            </a:ext>
+          </a:extLst>
+        </p:spPr>
+      </p:pic>
+      <p:pic>
+        <p:nvPicPr>
+          <p:cNvPr id="1032" name="Picture 8" descr="Image result for handlebars js"/>
+          <p:cNvPicPr>
+            <a:picLocks noChangeAspect="1" noChangeArrowheads="1"/>
+          </p:cNvPicPr>
+          <p:nvPr/>
+        </p:nvPicPr>
+        <p:blipFill>
+          <a:blip r:embed="rId4">
+            <a:extLst>
+              <a:ext uri="{28A0092B-C50C-407E-A947-70E740481C1C}">
+                <a14:useLocalDpi xmlns:a14="http://schemas.microsoft.com/office/drawing/2010/main" val="0"/>
+              </a:ext>
+            </a:extLst>
+          </a:blip>
+          <a:srcRect/>
+          <a:stretch>
+            <a:fillRect/>
+          </a:stretch>
+        </p:blipFill>
+        <p:spPr bwMode="auto">
+          <a:xfrm>
+            <a:off x="762000" y="2588916"/>
+            <a:ext cx="2022682" cy="1525884"/>
+          </a:xfrm>
+          <a:prstGeom prst="rect">
+            <a:avLst/>
+          </a:prstGeom>
+          <a:noFill/>
+          <a:extLst>
+            <a:ext uri="{909E8E84-426E-40DD-AFC4-6F175D3DCCD1}">
+              <a14:hiddenFill xmlns:a14="http://schemas.microsoft.com/office/drawing/2010/main">
+                <a:solidFill>
+                  <a:srgbClr val="FFFFFF"/>
+                </a:solidFill>
+              </a14:hiddenFill>
+            </a:ext>
+          </a:extLst>
+        </p:spPr>
+      </p:pic>
+      <p:pic>
+        <p:nvPicPr>
+          <p:cNvPr id="1034" name="Picture 10" descr="Image result for dust js"/>
+          <p:cNvPicPr>
+            <a:picLocks noChangeAspect="1" noChangeArrowheads="1"/>
+          </p:cNvPicPr>
+          <p:nvPr/>
+        </p:nvPicPr>
+        <p:blipFill>
+          <a:blip r:embed="rId5">
+            <a:extLst>
+              <a:ext uri="{28A0092B-C50C-407E-A947-70E740481C1C}">
+                <a14:useLocalDpi xmlns:a14="http://schemas.microsoft.com/office/drawing/2010/main" val="0"/>
+              </a:ext>
+            </a:extLst>
+          </a:blip>
+          <a:srcRect/>
+          <a:stretch>
+            <a:fillRect/>
+          </a:stretch>
+        </p:blipFill>
+        <p:spPr bwMode="auto">
+          <a:xfrm>
+            <a:off x="3219448" y="838200"/>
+            <a:ext cx="2724152" cy="2724152"/>
+          </a:xfrm>
+          <a:prstGeom prst="rect">
+            <a:avLst/>
+          </a:prstGeom>
+          <a:noFill/>
+          <a:extLst>
+            <a:ext uri="{909E8E84-426E-40DD-AFC4-6F175D3DCCD1}">
+              <a14:hiddenFill xmlns:a14="http://schemas.microsoft.com/office/drawing/2010/main">
+                <a:solidFill>
+                  <a:srgbClr val="FFFFFF"/>
+                </a:solidFill>
+              </a14:hiddenFill>
+            </a:ext>
+          </a:extLst>
+        </p:spPr>
+      </p:pic>
+      <p:pic>
+        <p:nvPicPr>
+          <p:cNvPr id="1026" name="Picture 2" descr="doT.js"/>
+          <p:cNvPicPr>
+            <a:picLocks noChangeAspect="1" noChangeArrowheads="1"/>
+          </p:cNvPicPr>
+          <p:nvPr/>
+        </p:nvPicPr>
+        <p:blipFill>
+          <a:blip r:embed="rId6">
+            <a:extLst>
+              <a:ext uri="{28A0092B-C50C-407E-A947-70E740481C1C}">
+                <a14:useLocalDpi xmlns:a14="http://schemas.microsoft.com/office/drawing/2010/main" val="0"/>
+              </a:ext>
+            </a:extLst>
+          </a:blip>
+          <a:srcRect/>
+          <a:stretch>
+            <a:fillRect/>
+          </a:stretch>
+        </p:blipFill>
+        <p:spPr bwMode="auto">
+          <a:xfrm>
+            <a:off x="3629024" y="4191000"/>
+            <a:ext cx="1905000" cy="1905000"/>
+          </a:xfrm>
+          <a:prstGeom prst="rect">
+            <a:avLst/>
+          </a:prstGeom>
+          <a:noFill/>
+          <a:extLst>
+            <a:ext uri="{909E8E84-426E-40DD-AFC4-6F175D3DCCD1}">
+              <a14:hiddenFill xmlns:a14="http://schemas.microsoft.com/office/drawing/2010/main">
+                <a:solidFill>
+                  <a:srgbClr val="FFFFFF"/>
+                </a:solidFill>
+              </a14:hiddenFill>
+            </a:ext>
+          </a:extLst>
         </p:spPr>
       </p:pic>
     </p:spTree>
@@ -8329,8 +8542,39 @@
         </p:nvSpPr>
         <p:spPr/>
         <p:txBody>
+          <a:bodyPr/>
+          <a:lstStyle/>
+          <a:p>
+            <a:r>
+              <a:rPr lang="en-US" dirty="0" smtClean="0">
+                <a:solidFill>
+                  <a:schemeClr val="bg1"/>
+                </a:solidFill>
+              </a:rPr>
+              <a:t>Who the heck am I</a:t>
+            </a:r>
+            <a:endParaRPr lang="en-US" dirty="0">
+              <a:solidFill>
+                <a:schemeClr val="bg1"/>
+              </a:solidFill>
+            </a:endParaRPr>
+          </a:p>
+        </p:txBody>
+      </p:sp>
+      <p:sp>
+        <p:nvSpPr>
+          <p:cNvPr id="3" name="Subtitle 2"/>
+          <p:cNvSpPr>
+            <a:spLocks noGrp="1"/>
+          </p:cNvSpPr>
+          <p:nvPr>
+            <p:ph idx="1"/>
+          </p:nvPr>
+        </p:nvSpPr>
+        <p:spPr/>
+        <p:txBody>
           <a:bodyPr>
-            <a:normAutofit fontScale="90000"/>
+            <a:noAutofit/>
           </a:bodyPr>
           <a:lstStyle/>
           <a:p>
@@ -8340,8 +8584,187 @@
                   <a:schemeClr val="bg1"/>
                 </a:solidFill>
               </a:rPr>
-              <a:t>Welcome to the                 community</a:t>
-            </a:r>
+              <a:t>Head of Research and Development + and an Application Developer at</a:t>
+            </a:r>
+          </a:p>
+          <a:p>
+            <a:endParaRPr lang="en-US" dirty="0">
+              <a:solidFill>
+                <a:schemeClr val="bg1"/>
+              </a:solidFill>
+            </a:endParaRPr>
+          </a:p>
+          <a:p>
+            <a:r>
+              <a:rPr lang="en-US" dirty="0" smtClean="0">
+                <a:solidFill>
+                  <a:schemeClr val="bg1"/>
+                </a:solidFill>
+              </a:rPr>
+              <a:t>I use node.js everyday for websites, tablet </a:t>
+            </a:r>
+            <a:r>
+              <a:rPr lang="en-US" sz="2800" dirty="0" smtClean="0">
+                <a:solidFill>
+                  <a:schemeClr val="bg1"/>
+                </a:solidFill>
+              </a:rPr>
+              <a:t>apps, robots, hardware control, heart rate </a:t>
+            </a:r>
+            <a:r>
+              <a:rPr lang="en-US" sz="2400" dirty="0" smtClean="0">
+                <a:solidFill>
+                  <a:schemeClr val="bg1"/>
+                </a:solidFill>
+              </a:rPr>
+              <a:t>monitoring, light control, sound effects, beer measuring, nerf wars, video </a:t>
+            </a:r>
+            <a:r>
+              <a:rPr lang="en-US" sz="2000" dirty="0" smtClean="0">
+                <a:solidFill>
+                  <a:schemeClr val="bg1"/>
+                </a:solidFill>
+              </a:rPr>
+              <a:t>games, computer vision,</a:t>
+            </a:r>
+            <a:r>
+              <a:rPr lang="en-US" sz="2400" dirty="0" smtClean="0">
+                <a:solidFill>
+                  <a:schemeClr val="bg1"/>
+                </a:solidFill>
+              </a:rPr>
+              <a:t> </a:t>
+            </a:r>
+            <a:r>
+              <a:rPr lang="en-US" sz="2000" dirty="0" smtClean="0">
+                <a:solidFill>
+                  <a:schemeClr val="bg1"/>
+                </a:solidFill>
+              </a:rPr>
+              <a:t>augmented reality, image manipulation, home </a:t>
+            </a:r>
+            <a:r>
+              <a:rPr lang="en-US" sz="1800" dirty="0" smtClean="0">
+                <a:solidFill>
+                  <a:schemeClr val="bg1"/>
+                </a:solidFill>
+              </a:rPr>
+              <a:t>automation, </a:t>
+            </a:r>
+            <a:r>
+              <a:rPr lang="en-US" sz="1800" dirty="0" err="1" smtClean="0">
+                <a:solidFill>
+                  <a:schemeClr val="bg1"/>
+                </a:solidFill>
+              </a:rPr>
+              <a:t>wifi</a:t>
+            </a:r>
+            <a:r>
+              <a:rPr lang="en-US" sz="1800" dirty="0" smtClean="0">
+                <a:solidFill>
+                  <a:schemeClr val="bg1"/>
+                </a:solidFill>
+              </a:rPr>
+              <a:t> tracking, </a:t>
+            </a:r>
+            <a:r>
+              <a:rPr lang="en-US" sz="1800" dirty="0" err="1" smtClean="0">
+                <a:solidFill>
+                  <a:schemeClr val="bg1"/>
+                </a:solidFill>
+              </a:rPr>
+              <a:t>microservices</a:t>
+            </a:r>
+            <a:r>
+              <a:rPr lang="en-US" sz="1800" dirty="0" smtClean="0">
+                <a:solidFill>
+                  <a:schemeClr val="bg1"/>
+                </a:solidFill>
+              </a:rPr>
+              <a:t>, e-mail handling,</a:t>
+            </a:r>
+            <a:r>
+              <a:rPr lang="en-US" sz="2000" dirty="0" smtClean="0">
+                <a:solidFill>
+                  <a:schemeClr val="bg1"/>
+                </a:solidFill>
+              </a:rPr>
+              <a:t> </a:t>
+            </a:r>
+            <a:r>
+              <a:rPr lang="en-US" sz="1800" dirty="0" smtClean="0">
+                <a:solidFill>
+                  <a:schemeClr val="bg1"/>
+                </a:solidFill>
+              </a:rPr>
+              <a:t>chat bots, artificial </a:t>
+            </a:r>
+            <a:r>
+              <a:rPr lang="en-US" sz="1600" dirty="0" smtClean="0">
+                <a:solidFill>
+                  <a:schemeClr val="bg1"/>
+                </a:solidFill>
+              </a:rPr>
+              <a:t>intelligence, streaming video,  big data, drink mixing (really), beach selfies, bit torrent, </a:t>
+            </a:r>
+            <a:r>
+              <a:rPr lang="en-US" sz="1400" dirty="0" err="1" smtClean="0">
+                <a:solidFill>
+                  <a:schemeClr val="bg1"/>
+                </a:solidFill>
+              </a:rPr>
+              <a:t>blockchain</a:t>
+            </a:r>
+            <a:r>
+              <a:rPr lang="en-US" sz="1400" dirty="0" smtClean="0">
+                <a:solidFill>
+                  <a:schemeClr val="bg1"/>
+                </a:solidFill>
+              </a:rPr>
+              <a:t>, distributed networking, mesh radio networking</a:t>
+            </a:r>
+            <a:r>
+              <a:rPr lang="en-US" sz="1400" smtClean="0">
+                <a:solidFill>
+                  <a:schemeClr val="bg1"/>
+                </a:solidFill>
+              </a:rPr>
+              <a:t>, permanent </a:t>
+            </a:r>
+            <a:r>
+              <a:rPr lang="en-US" sz="1400" dirty="0" smtClean="0">
+                <a:solidFill>
+                  <a:schemeClr val="bg1"/>
+                </a:solidFill>
+              </a:rPr>
+              <a:t>web…</a:t>
+            </a:r>
+            <a:endParaRPr lang="en-US" sz="1600" dirty="0" smtClean="0">
+              <a:solidFill>
+                <a:schemeClr val="bg1"/>
+              </a:solidFill>
+            </a:endParaRPr>
+          </a:p>
+          <a:p>
+            <a:pPr marL="0" indent="0" algn="ctr">
+              <a:buNone/>
+            </a:pPr>
+            <a:r>
+              <a:rPr lang="en-US" i="1" dirty="0" smtClean="0">
+                <a:solidFill>
+                  <a:schemeClr val="bg1"/>
+                </a:solidFill>
+              </a:rPr>
+              <a:t>and much more</a:t>
+            </a:r>
+            <a:endParaRPr lang="en-US" sz="4800" i="1" dirty="0" smtClean="0">
+              <a:solidFill>
+                <a:schemeClr val="bg1"/>
+              </a:solidFill>
+            </a:endParaRPr>
+          </a:p>
+          <a:p>
+            <a:pPr lvl="1"/>
             <a:endParaRPr lang="en-US" dirty="0">
               <a:solidFill>
                 <a:schemeClr val="bg1"/>
@@ -8382,273 +8805,92 @@
       </p:pic>
       <p:sp>
         <p:nvSpPr>
-          <p:cNvPr id="2" name="Content Placeholder 1"/>
-          <p:cNvSpPr>
-            <a:spLocks noGrp="1"/>
-          </p:cNvSpPr>
-          <p:nvPr>
-            <p:ph idx="1"/>
-          </p:nvPr>
-        </p:nvSpPr>
-        <p:spPr/>
-        <p:txBody>
-          <a:bodyPr>
-            <a:normAutofit fontScale="62500" lnSpcReduction="20000"/>
+          <p:cNvPr id="4" name="AutoShape 2" descr="http://blog.thisisfusion.com/wp-content/themes/thisIsFusion/library/images/logo.svg"/>
+          <p:cNvSpPr>
+            <a:spLocks noChangeAspect="1" noChangeArrowheads="1"/>
+          </p:cNvSpPr>
+          <p:nvPr/>
+        </p:nvSpPr>
+        <p:spPr bwMode="auto">
+          <a:xfrm>
+            <a:off x="155575" y="-144463"/>
+            <a:ext cx="304800" cy="304801"/>
+          </a:xfrm>
+          <a:prstGeom prst="rect">
+            <a:avLst/>
+          </a:prstGeom>
+          <a:noFill/>
+          <a:extLst>
+            <a:ext uri="{909E8E84-426E-40DD-AFC4-6F175D3DCCD1}">
+              <a14:hiddenFill xmlns:a14="http://schemas.microsoft.com/office/drawing/2010/main">
+                <a:solidFill>
+                  <a:srgbClr val="FFFFFF"/>
+                </a:solidFill>
+              </a14:hiddenFill>
+            </a:ext>
+          </a:extLst>
+        </p:spPr>
+        <p:txBody>
+          <a:bodyPr vert="horz" wrap="square" lIns="91440" tIns="45720" rIns="91440" bIns="45720" numCol="1" anchor="t" anchorCtr="0" compatLnSpc="1">
+            <a:prstTxWarp prst="textNoShape">
+              <a:avLst/>
+            </a:prstTxWarp>
           </a:bodyPr>
           <a:lstStyle/>
           <a:p>
-            <a:r>
-              <a:rPr lang="en-US" dirty="0" err="1" smtClean="0">
-                <a:solidFill>
-                  <a:schemeClr val="bg1"/>
-                </a:solidFill>
-              </a:rPr>
-              <a:t>node.jSTL</a:t>
-            </a:r>
-            <a:r>
-              <a:rPr lang="en-US" dirty="0" smtClean="0">
-                <a:solidFill>
-                  <a:schemeClr val="bg1"/>
-                </a:solidFill>
-              </a:rPr>
-              <a:t> meets at least once a month</a:t>
-            </a:r>
-          </a:p>
-          <a:p>
-            <a:pPr lvl="1"/>
-            <a:r>
-              <a:rPr lang="en-US" dirty="0" smtClean="0">
-                <a:solidFill>
-                  <a:schemeClr val="bg1"/>
-                </a:solidFill>
-              </a:rPr>
-              <a:t>We try to make talks good for experts </a:t>
-            </a:r>
-            <a:r>
-              <a:rPr lang="en-US" i="1" dirty="0" smtClean="0">
-                <a:solidFill>
-                  <a:schemeClr val="bg1"/>
-                </a:solidFill>
-              </a:rPr>
-              <a:t>and</a:t>
-            </a:r>
-            <a:r>
-              <a:rPr lang="en-US" dirty="0" smtClean="0">
-                <a:solidFill>
-                  <a:schemeClr val="bg1"/>
-                </a:solidFill>
-              </a:rPr>
-              <a:t> beginners</a:t>
-            </a:r>
-          </a:p>
-          <a:p>
-            <a:pPr lvl="1"/>
-            <a:r>
-              <a:rPr lang="en-US" dirty="0" smtClean="0">
-                <a:solidFill>
-                  <a:schemeClr val="bg1"/>
-                </a:solidFill>
-              </a:rPr>
-              <a:t>Open floor time to talk to experts, ask for help on projects, get resources to learn</a:t>
-            </a:r>
-          </a:p>
-          <a:p>
-            <a:pPr lvl="1"/>
-            <a:r>
-              <a:rPr lang="en-US" dirty="0" smtClean="0">
-                <a:solidFill>
-                  <a:schemeClr val="bg1"/>
-                </a:solidFill>
-              </a:rPr>
-              <a:t>“Classes” like this is new, and we’d like your feedback to have more</a:t>
-            </a:r>
-          </a:p>
-          <a:p>
-            <a:pPr lvl="1"/>
-            <a:endParaRPr lang="en-US" dirty="0">
-              <a:solidFill>
-                <a:schemeClr val="bg1"/>
-              </a:solidFill>
-            </a:endParaRPr>
-          </a:p>
-          <a:p>
-            <a:r>
-              <a:rPr lang="en-US" dirty="0" err="1" smtClean="0">
-                <a:solidFill>
-                  <a:schemeClr val="bg1"/>
-                </a:solidFill>
-              </a:rPr>
-              <a:t>jSTL</a:t>
-            </a:r>
-            <a:r>
-              <a:rPr lang="en-US" dirty="0" smtClean="0">
-                <a:solidFill>
-                  <a:schemeClr val="bg1"/>
-                </a:solidFill>
-              </a:rPr>
-              <a:t> coming soon!</a:t>
-            </a:r>
-          </a:p>
-          <a:p>
-            <a:pPr lvl="1"/>
-            <a:r>
-              <a:rPr lang="en-US" dirty="0" smtClean="0">
-                <a:solidFill>
-                  <a:schemeClr val="bg1"/>
-                </a:solidFill>
-              </a:rPr>
-              <a:t>General </a:t>
-            </a:r>
-            <a:r>
-              <a:rPr lang="en-US" dirty="0" err="1" smtClean="0">
-                <a:solidFill>
-                  <a:schemeClr val="bg1"/>
-                </a:solidFill>
-              </a:rPr>
-              <a:t>Javascript</a:t>
-            </a:r>
-            <a:r>
-              <a:rPr lang="en-US" dirty="0" smtClean="0">
-                <a:solidFill>
-                  <a:schemeClr val="bg1"/>
-                </a:solidFill>
-              </a:rPr>
-              <a:t> meetup to incorporate ALL front end frameworks + node</a:t>
-            </a:r>
-          </a:p>
-          <a:p>
-            <a:pPr lvl="1"/>
-            <a:r>
-              <a:rPr lang="en-US" dirty="0" smtClean="0">
-                <a:solidFill>
-                  <a:schemeClr val="bg1"/>
-                </a:solidFill>
-              </a:rPr>
-              <a:t>Work in progress</a:t>
-            </a:r>
-          </a:p>
-          <a:p>
-            <a:endParaRPr lang="en-US" dirty="0">
-              <a:solidFill>
-                <a:schemeClr val="bg1"/>
-              </a:solidFill>
-            </a:endParaRPr>
-          </a:p>
-          <a:p>
-            <a:r>
-              <a:rPr lang="en-US" dirty="0" smtClean="0">
-                <a:solidFill>
-                  <a:schemeClr val="bg1"/>
-                </a:solidFill>
-              </a:rPr>
-              <a:t>Join STL-Tech slack</a:t>
-            </a:r>
-            <a:r>
-              <a:rPr lang="en-US" dirty="0">
-                <a:solidFill>
-                  <a:schemeClr val="bg1"/>
-                </a:solidFill>
-              </a:rPr>
-              <a:t>! </a:t>
-            </a:r>
-            <a:r>
-              <a:rPr lang="en-US" i="1" dirty="0" smtClean="0">
-                <a:solidFill>
-                  <a:schemeClr val="accent1">
-                    <a:lumMod val="40000"/>
-                    <a:lumOff val="60000"/>
-                  </a:schemeClr>
-                </a:solidFill>
-              </a:rPr>
-              <a:t>stltech.herokuapp.com </a:t>
-            </a:r>
-            <a:r>
-              <a:rPr lang="en-US" dirty="0" smtClean="0">
-                <a:solidFill>
-                  <a:schemeClr val="bg1"/>
-                </a:solidFill>
-              </a:rPr>
-              <a:t>to get an invite</a:t>
-            </a:r>
-          </a:p>
-          <a:p>
-            <a:endParaRPr lang="en-US" i="1" dirty="0">
-              <a:solidFill>
-                <a:schemeClr val="bg1"/>
-              </a:solidFill>
-            </a:endParaRPr>
-          </a:p>
-          <a:p>
-            <a:r>
-              <a:rPr lang="en-US" i="1" dirty="0" smtClean="0">
-                <a:solidFill>
-                  <a:schemeClr val="bg1"/>
-                </a:solidFill>
-              </a:rPr>
-              <a:t>#node</a:t>
-            </a:r>
-            <a:r>
-              <a:rPr lang="en-US" dirty="0" smtClean="0">
-                <a:solidFill>
-                  <a:schemeClr val="bg1"/>
-                </a:solidFill>
-              </a:rPr>
-              <a:t> channel Is connected to other slack groups around the world</a:t>
-            </a:r>
-          </a:p>
-          <a:p>
-            <a:endParaRPr lang="en-US" dirty="0">
-              <a:solidFill>
-                <a:schemeClr val="bg1"/>
-              </a:solidFill>
-            </a:endParaRPr>
-          </a:p>
-          <a:p>
-            <a:r>
-              <a:rPr lang="en-US" dirty="0" smtClean="0">
-                <a:solidFill>
-                  <a:schemeClr val="bg1"/>
-                </a:solidFill>
-              </a:rPr>
-              <a:t>@</a:t>
-            </a:r>
-            <a:r>
-              <a:rPr lang="en-US" dirty="0" err="1" smtClean="0">
-                <a:solidFill>
-                  <a:schemeClr val="bg1"/>
-                </a:solidFill>
-              </a:rPr>
-              <a:t>keithchester</a:t>
-            </a:r>
-            <a:r>
-              <a:rPr lang="en-US" dirty="0" smtClean="0">
-                <a:solidFill>
-                  <a:schemeClr val="bg1"/>
-                </a:solidFill>
-              </a:rPr>
-              <a:t> is my username there</a:t>
-            </a:r>
-            <a:endParaRPr lang="en-US" dirty="0" smtClean="0">
-              <a:solidFill>
-                <a:schemeClr val="accent1">
-                  <a:lumMod val="40000"/>
-                  <a:lumOff val="60000"/>
-                </a:schemeClr>
-              </a:solidFill>
-            </a:endParaRPr>
+            <a:endParaRPr lang="en-US"/>
+          </a:p>
+        </p:txBody>
+      </p:sp>
+      <p:sp>
+        <p:nvSpPr>
+          <p:cNvPr id="6" name="AutoShape 4" descr="http://blog.thisisfusion.com/wp-content/themes/thisIsFusion/library/images/logo.svg"/>
+          <p:cNvSpPr>
+            <a:spLocks noChangeAspect="1" noChangeArrowheads="1"/>
+          </p:cNvSpPr>
+          <p:nvPr/>
+        </p:nvSpPr>
+        <p:spPr bwMode="auto">
+          <a:xfrm>
+            <a:off x="307975" y="7937"/>
+            <a:ext cx="304800" cy="304801"/>
+          </a:xfrm>
+          <a:prstGeom prst="rect">
+            <a:avLst/>
+          </a:prstGeom>
+          <a:noFill/>
+          <a:extLst>
+            <a:ext uri="{909E8E84-426E-40DD-AFC4-6F175D3DCCD1}">
+              <a14:hiddenFill xmlns:a14="http://schemas.microsoft.com/office/drawing/2010/main">
+                <a:solidFill>
+                  <a:srgbClr val="FFFFFF"/>
+                </a:solidFill>
+              </a14:hiddenFill>
+            </a:ext>
+          </a:extLst>
+        </p:spPr>
+        <p:txBody>
+          <a:bodyPr vert="horz" wrap="square" lIns="91440" tIns="45720" rIns="91440" bIns="45720" numCol="1" anchor="t" anchorCtr="0" compatLnSpc="1">
+            <a:prstTxWarp prst="textNoShape">
+              <a:avLst/>
+            </a:prstTxWarp>
+          </a:bodyPr>
+          <a:lstStyle/>
+          <a:p>
+            <a:endParaRPr lang="en-US"/>
           </a:p>
         </p:txBody>
       </p:sp>
       <p:pic>
         <p:nvPicPr>
-          <p:cNvPr id="9" name="Picture 8"/>
+          <p:cNvPr id="7" name="Picture 6"/>
           <p:cNvPicPr>
             <a:picLocks noChangeAspect="1"/>
           </p:cNvPicPr>
           <p:nvPr/>
         </p:nvPicPr>
         <p:blipFill>
-          <a:blip r:embed="rId2">
+          <a:blip r:embed="rId3" cstate="print">
             <a:extLst>
               <a:ext uri="{28A0092B-C50C-407E-A947-70E740481C1C}">
                 <a14:useLocalDpi xmlns:a14="http://schemas.microsoft.com/office/drawing/2010/main" val="0"/>
@@ -8661,8 +8903,8 @@
         </p:blipFill>
         <p:spPr>
           <a:xfrm>
-            <a:off x="4267200" y="533400"/>
-            <a:ext cx="1644363" cy="685800"/>
+            <a:off x="5045813" y="2209800"/>
+            <a:ext cx="685800" cy="613730"/>
           </a:xfrm>
           <a:prstGeom prst="rect">
             <a:avLst/>
@@ -8672,7 +8914,7 @@
     </p:spTree>
     <p:extLst>
       <p:ext uri="{BB962C8B-B14F-4D97-AF65-F5344CB8AC3E}">
-        <p14:creationId xmlns:p14="http://schemas.microsoft.com/office/powerpoint/2010/main" val="2060994605"/>
+        <p14:creationId xmlns:p14="http://schemas.microsoft.com/office/powerpoint/2010/main" val="698550408"/>
       </p:ext>
     </p:extLst>
   </p:cSld>
@@ -9133,7 +9375,9 @@
         </p:nvSpPr>
         <p:spPr/>
         <p:txBody>
-          <a:bodyPr/>
+          <a:bodyPr>
+            <a:normAutofit lnSpcReduction="10000"/>
+          </a:bodyPr>
           <a:lstStyle/>
           <a:p>
             <a:r>
@@ -9142,17 +9386,32 @@
                   <a:schemeClr val="bg1"/>
                 </a:solidFill>
               </a:rPr>
-              <a:t>Everything we did can be found at</a:t>
-            </a:r>
-          </a:p>
-          <a:p>
+              <a:t>Everything we did can be found </a:t>
+            </a:r>
             <a:r>
               <a:rPr lang="en-US" dirty="0" smtClean="0">
                 <a:solidFill>
                   <a:schemeClr val="bg1"/>
                 </a:solidFill>
               </a:rPr>
-              <a:t>https://github.com/hlfshell/something</a:t>
+              <a:t>at</a:t>
+            </a:r>
+          </a:p>
+          <a:p>
+            <a:endParaRPr lang="en-US" dirty="0" smtClean="0">
+              <a:solidFill>
+                <a:schemeClr val="bg1"/>
+              </a:solidFill>
+            </a:endParaRPr>
+          </a:p>
+          <a:p>
+            <a:r>
+              <a:rPr lang="en-US" sz="1800" dirty="0">
+                <a:solidFill>
+                  <a:schemeClr val="bg1"/>
+                </a:solidFill>
+              </a:rPr>
+              <a:t>https://github.com/hlfshell/node.jSTL-Intro-Series---An-Introduction-to-Express</a:t>
             </a:r>
             <a:endParaRPr lang="en-US" dirty="0">
               <a:solidFill>

</xml_diff>

<commit_message>
feature: Finished presentation, started backup completed project in case live coding fails
</commit_message>
<xml_diff>
--- a/nodejs intro to express.pptx
+++ b/nodejs intro to express.pptx
@@ -5,7 +5,7 @@
     <p:sldMasterId id="2147483648" r:id="rId1"/>
   </p:sldMasterIdLst>
   <p:notesMasterIdLst>
-    <p:notesMasterId r:id="rId34"/>
+    <p:notesMasterId r:id="rId32"/>
   </p:notesMasterIdLst>
   <p:sldIdLst>
     <p:sldId id="256" r:id="rId2"/>
@@ -29,17 +29,15 @@
     <p:sldId id="277" r:id="rId20"/>
     <p:sldId id="278" r:id="rId21"/>
     <p:sldId id="279" r:id="rId22"/>
-    <p:sldId id="280" r:id="rId23"/>
-    <p:sldId id="281" r:id="rId24"/>
-    <p:sldId id="282" r:id="rId25"/>
-    <p:sldId id="283" r:id="rId26"/>
-    <p:sldId id="290" r:id="rId27"/>
-    <p:sldId id="284" r:id="rId28"/>
-    <p:sldId id="287" r:id="rId29"/>
-    <p:sldId id="291" r:id="rId30"/>
-    <p:sldId id="286" r:id="rId31"/>
-    <p:sldId id="285" r:id="rId32"/>
-    <p:sldId id="292" r:id="rId33"/>
+    <p:sldId id="293" r:id="rId23"/>
+    <p:sldId id="282" r:id="rId24"/>
+    <p:sldId id="283" r:id="rId25"/>
+    <p:sldId id="290" r:id="rId26"/>
+    <p:sldId id="284" r:id="rId27"/>
+    <p:sldId id="287" r:id="rId28"/>
+    <p:sldId id="291" r:id="rId29"/>
+    <p:sldId id="286" r:id="rId30"/>
+    <p:sldId id="292" r:id="rId31"/>
   </p:sldIdLst>
   <p:sldSz cx="9144000" cy="6858000" type="screen4x3"/>
   <p:notesSz cx="6858000" cy="9144000"/>
@@ -223,7 +221,7 @@
           <a:p>
             <a:fld id="{E843B134-FC3F-4215-BD54-639A1EEA8DA6}" type="datetimeFigureOut">
               <a:rPr lang="en-US" smtClean="0"/>
-              <a:t>2/26/2017</a:t>
+              <a:t>2/27/2017</a:t>
             </a:fld>
             <a:endParaRPr lang="en-US"/>
           </a:p>
@@ -556,7 +554,7 @@
           <a:p>
             <a:fld id="{8FA65F1B-0EDE-4749-96F5-11D4E7E87DD6}" type="slidenum">
               <a:rPr lang="en-US" smtClean="0"/>
-              <a:t>30</a:t>
+              <a:t>29</a:t>
             </a:fld>
             <a:endParaRPr lang="en-US"/>
           </a:p>
@@ -756,7 +754,7 @@
           <a:p>
             <a:fld id="{75A3C5B4-6199-4031-B143-8199622DDC1A}" type="datetimeFigureOut">
               <a:rPr lang="en-US" smtClean="0"/>
-              <a:t>2/26/2017</a:t>
+              <a:t>2/27/2017</a:t>
             </a:fld>
             <a:endParaRPr lang="en-US"/>
           </a:p>
@@ -926,7 +924,7 @@
           <a:p>
             <a:fld id="{75A3C5B4-6199-4031-B143-8199622DDC1A}" type="datetimeFigureOut">
               <a:rPr lang="en-US" smtClean="0"/>
-              <a:t>2/26/2017</a:t>
+              <a:t>2/27/2017</a:t>
             </a:fld>
             <a:endParaRPr lang="en-US"/>
           </a:p>
@@ -1106,7 +1104,7 @@
           <a:p>
             <a:fld id="{75A3C5B4-6199-4031-B143-8199622DDC1A}" type="datetimeFigureOut">
               <a:rPr lang="en-US" smtClean="0"/>
-              <a:t>2/26/2017</a:t>
+              <a:t>2/27/2017</a:t>
             </a:fld>
             <a:endParaRPr lang="en-US"/>
           </a:p>
@@ -1276,7 +1274,7 @@
           <a:p>
             <a:fld id="{75A3C5B4-6199-4031-B143-8199622DDC1A}" type="datetimeFigureOut">
               <a:rPr lang="en-US" smtClean="0"/>
-              <a:t>2/26/2017</a:t>
+              <a:t>2/27/2017</a:t>
             </a:fld>
             <a:endParaRPr lang="en-US"/>
           </a:p>
@@ -1522,7 +1520,7 @@
           <a:p>
             <a:fld id="{75A3C5B4-6199-4031-B143-8199622DDC1A}" type="datetimeFigureOut">
               <a:rPr lang="en-US" smtClean="0"/>
-              <a:t>2/26/2017</a:t>
+              <a:t>2/27/2017</a:t>
             </a:fld>
             <a:endParaRPr lang="en-US"/>
           </a:p>
@@ -1810,7 +1808,7 @@
           <a:p>
             <a:fld id="{75A3C5B4-6199-4031-B143-8199622DDC1A}" type="datetimeFigureOut">
               <a:rPr lang="en-US" smtClean="0"/>
-              <a:t>2/26/2017</a:t>
+              <a:t>2/27/2017</a:t>
             </a:fld>
             <a:endParaRPr lang="en-US"/>
           </a:p>
@@ -2232,7 +2230,7 @@
           <a:p>
             <a:fld id="{75A3C5B4-6199-4031-B143-8199622DDC1A}" type="datetimeFigureOut">
               <a:rPr lang="en-US" smtClean="0"/>
-              <a:t>2/26/2017</a:t>
+              <a:t>2/27/2017</a:t>
             </a:fld>
             <a:endParaRPr lang="en-US"/>
           </a:p>
@@ -2350,7 +2348,7 @@
           <a:p>
             <a:fld id="{75A3C5B4-6199-4031-B143-8199622DDC1A}" type="datetimeFigureOut">
               <a:rPr lang="en-US" smtClean="0"/>
-              <a:t>2/26/2017</a:t>
+              <a:t>2/27/2017</a:t>
             </a:fld>
             <a:endParaRPr lang="en-US"/>
           </a:p>
@@ -2445,7 +2443,7 @@
           <a:p>
             <a:fld id="{75A3C5B4-6199-4031-B143-8199622DDC1A}" type="datetimeFigureOut">
               <a:rPr lang="en-US" smtClean="0"/>
-              <a:t>2/26/2017</a:t>
+              <a:t>2/27/2017</a:t>
             </a:fld>
             <a:endParaRPr lang="en-US"/>
           </a:p>
@@ -2722,7 +2720,7 @@
           <a:p>
             <a:fld id="{75A3C5B4-6199-4031-B143-8199622DDC1A}" type="datetimeFigureOut">
               <a:rPr lang="en-US" smtClean="0"/>
-              <a:t>2/26/2017</a:t>
+              <a:t>2/27/2017</a:t>
             </a:fld>
             <a:endParaRPr lang="en-US"/>
           </a:p>
@@ -2975,7 +2973,7 @@
           <a:p>
             <a:fld id="{75A3C5B4-6199-4031-B143-8199622DDC1A}" type="datetimeFigureOut">
               <a:rPr lang="en-US" smtClean="0"/>
-              <a:t>2/26/2017</a:t>
+              <a:t>2/27/2017</a:t>
             </a:fld>
             <a:endParaRPr lang="en-US"/>
           </a:p>
@@ -3188,7 +3186,7 @@
           <a:p>
             <a:fld id="{75A3C5B4-6199-4031-B143-8199622DDC1A}" type="datetimeFigureOut">
               <a:rPr lang="en-US" smtClean="0"/>
-              <a:t>2/26/2017</a:t>
+              <a:t>2/27/2017</a:t>
             </a:fld>
             <a:endParaRPr lang="en-US"/>
           </a:p>
@@ -5214,7 +5212,7 @@
                   <a:schemeClr val="bg1"/>
                 </a:solidFill>
               </a:rPr>
-              <a:t>Routing Order</a:t>
+              <a:t>Routing</a:t>
             </a:r>
             <a:endParaRPr lang="en-US" dirty="0">
               <a:solidFill>
@@ -5883,7 +5881,7 @@
         </p:nvSpPr>
         <p:spPr/>
         <p:txBody>
-          <a:bodyPr numCol="2"/>
+          <a:bodyPr numCol="1"/>
           <a:lstStyle/>
           <a:p>
             <a:pPr marL="0" indent="0" algn="ctr">
@@ -6471,37 +6469,6 @@
           </a:p>
         </p:txBody>
       </p:sp>
-      <p:sp>
-        <p:nvSpPr>
-          <p:cNvPr id="3" name="Content Placeholder 2"/>
-          <p:cNvSpPr>
-            <a:spLocks noGrp="1"/>
-          </p:cNvSpPr>
-          <p:nvPr>
-            <p:ph idx="1"/>
-          </p:nvPr>
-        </p:nvSpPr>
-        <p:spPr/>
-        <p:txBody>
-          <a:bodyPr/>
-          <a:lstStyle/>
-          <a:p>
-            <a:r>
-              <a:rPr lang="en-US" dirty="0" smtClean="0">
-                <a:solidFill>
-                  <a:schemeClr val="bg1"/>
-                </a:solidFill>
-              </a:rPr>
-              <a:t>What is it, why would you use it, next()</a:t>
-            </a:r>
-            <a:endParaRPr lang="en-US" dirty="0">
-              <a:solidFill>
-                <a:schemeClr val="bg1"/>
-              </a:solidFill>
-            </a:endParaRPr>
-          </a:p>
-        </p:txBody>
-      </p:sp>
       <p:pic>
         <p:nvPicPr>
           <p:cNvPr id="10" name="Picture 9"/>
@@ -6530,6 +6497,60 @@
           <a:prstGeom prst="rect">
             <a:avLst/>
           </a:prstGeom>
+        </p:spPr>
+      </p:pic>
+      <p:pic>
+        <p:nvPicPr>
+          <p:cNvPr id="1026" name="Picture 2"/>
+          <p:cNvPicPr>
+            <a:picLocks noChangeAspect="1" noChangeArrowheads="1"/>
+          </p:cNvPicPr>
+          <p:nvPr/>
+        </p:nvPicPr>
+        <p:blipFill>
+          <a:blip r:embed="rId3">
+            <a:extLst>
+              <a:ext uri="{28A0092B-C50C-407E-A947-70E740481C1C}">
+                <a14:useLocalDpi xmlns:a14="http://schemas.microsoft.com/office/drawing/2010/main" val="0"/>
+              </a:ext>
+            </a:extLst>
+          </a:blip>
+          <a:srcRect/>
+          <a:stretch>
+            <a:fillRect/>
+          </a:stretch>
+        </p:blipFill>
+        <p:spPr bwMode="auto">
+          <a:xfrm>
+            <a:off x="123369" y="1423273"/>
+            <a:ext cx="8897263" cy="3758327"/>
+          </a:xfrm>
+          <a:prstGeom prst="rect">
+            <a:avLst/>
+          </a:prstGeom>
+          <a:noFill/>
+          <a:ln>
+            <a:noFill/>
+          </a:ln>
+          <a:extLst>
+            <a:ext uri="{909E8E84-426E-40DD-AFC4-6F175D3DCCD1}">
+              <a14:hiddenFill xmlns:a14="http://schemas.microsoft.com/office/drawing/2010/main">
+                <a:solidFill>
+                  <a:schemeClr val="accent1"/>
+                </a:solidFill>
+              </a14:hiddenFill>
+            </a:ext>
+            <a:ext uri="{91240B29-F687-4F45-9708-019B960494DF}">
+              <a14:hiddenLine xmlns:a14="http://schemas.microsoft.com/office/drawing/2010/main" w="9525">
+                <a:solidFill>
+                  <a:schemeClr val="tx1"/>
+                </a:solidFill>
+                <a:miter lim="800000"/>
+                <a:headEnd/>
+                <a:tailEnd/>
+              </a14:hiddenLine>
+            </a:ext>
+          </a:extLst>
         </p:spPr>
       </p:pic>
     </p:spTree>
@@ -6587,7 +6608,12 @@
             <p:ph type="title"/>
           </p:nvPr>
         </p:nvSpPr>
-        <p:spPr/>
+        <p:spPr>
+          <a:xfrm>
+            <a:off x="1789874" y="-304800"/>
+            <a:ext cx="5620928" cy="1143000"/>
+          </a:xfrm>
+        </p:spPr>
         <p:txBody>
           <a:bodyPr>
             <a:normAutofit/>
@@ -6595,14 +6621,22 @@
           <a:lstStyle/>
           <a:p>
             <a:r>
-              <a:rPr lang="en-US" dirty="0" smtClean="0">
-                <a:solidFill>
-                  <a:schemeClr val="bg1"/>
-                </a:solidFill>
-              </a:rPr>
-              <a:t>Popular middleware</a:t>
-            </a:r>
-            <a:endParaRPr lang="en-US" dirty="0">
+              <a:rPr lang="en-US" sz="3200" dirty="0">
+                <a:solidFill>
+                  <a:schemeClr val="bg1"/>
+                </a:solidFill>
+              </a:rPr>
+              <a:t>b</a:t>
+            </a:r>
+            <a:r>
+              <a:rPr lang="en-US" sz="3200" dirty="0" smtClean="0">
+                <a:solidFill>
+                  <a:schemeClr val="bg1"/>
+                </a:solidFill>
+              </a:rPr>
+              <a:t>ody-parser</a:t>
+            </a:r>
+            <a:endParaRPr lang="en-US" sz="3200" dirty="0">
               <a:solidFill>
                 <a:schemeClr val="bg1"/>
               </a:solidFill>
@@ -6610,42 +6644,11 @@
           </a:p>
         </p:txBody>
       </p:sp>
-      <p:sp>
-        <p:nvSpPr>
-          <p:cNvPr id="3" name="Content Placeholder 2"/>
-          <p:cNvSpPr>
-            <a:spLocks noGrp="1"/>
-          </p:cNvSpPr>
-          <p:nvPr>
-            <p:ph idx="1"/>
-          </p:nvPr>
-        </p:nvSpPr>
-        <p:spPr/>
-        <p:txBody>
-          <a:bodyPr/>
-          <a:lstStyle/>
-          <a:p>
-            <a:r>
-              <a:rPr lang="en-US" dirty="0" smtClean="0">
-                <a:solidFill>
-                  <a:schemeClr val="bg1"/>
-                </a:solidFill>
-              </a:rPr>
-              <a:t>Content</a:t>
-            </a:r>
-            <a:endParaRPr lang="en-US" dirty="0">
-              <a:solidFill>
-                <a:schemeClr val="bg1"/>
-              </a:solidFill>
-            </a:endParaRPr>
-          </a:p>
-        </p:txBody>
-      </p:sp>
       <p:pic>
         <p:nvPicPr>
-          <p:cNvPr id="10" name="Picture 9"/>
+          <p:cNvPr id="2050" name="Picture 2"/>
           <p:cNvPicPr>
-            <a:picLocks noChangeAspect="1"/>
+            <a:picLocks noChangeAspect="1" noChangeArrowheads="1"/>
           </p:cNvPicPr>
           <p:nvPr/>
         </p:nvPicPr>
@@ -6657,18 +6660,42 @@
               </a:ext>
             </a:extLst>
           </a:blip>
+          <a:srcRect/>
           <a:stretch>
             <a:fillRect/>
           </a:stretch>
         </p:blipFill>
-        <p:spPr>
-          <a:xfrm>
-            <a:off x="7575188" y="6248400"/>
-            <a:ext cx="1461656" cy="609600"/>
+        <p:spPr bwMode="auto">
+          <a:xfrm>
+            <a:off x="289560" y="557441"/>
+            <a:ext cx="8549640" cy="6148159"/>
           </a:xfrm>
           <a:prstGeom prst="rect">
             <a:avLst/>
           </a:prstGeom>
+          <a:noFill/>
+          <a:ln>
+            <a:noFill/>
+          </a:ln>
+          <a:extLst>
+            <a:ext uri="{909E8E84-426E-40DD-AFC4-6F175D3DCCD1}">
+              <a14:hiddenFill xmlns:a14="http://schemas.microsoft.com/office/drawing/2010/main">
+                <a:solidFill>
+                  <a:schemeClr val="accent1"/>
+                </a:solidFill>
+              </a14:hiddenFill>
+            </a:ext>
+            <a:ext uri="{91240B29-F687-4F45-9708-019B960494DF}">
+              <a14:hiddenLine xmlns:a14="http://schemas.microsoft.com/office/drawing/2010/main" w="9525">
+                <a:solidFill>
+                  <a:schemeClr val="tx1"/>
+                </a:solidFill>
+                <a:miter lim="800000"/>
+                <a:headEnd/>
+                <a:tailEnd/>
+              </a14:hiddenLine>
+            </a:ext>
+          </a:extLst>
         </p:spPr>
       </p:pic>
     </p:spTree>
@@ -6739,7 +6766,7 @@
                   <a:schemeClr val="bg1"/>
                 </a:solidFill>
               </a:rPr>
-              <a:t>Making your own middleware</a:t>
+              <a:t>Popular middleware</a:t>
             </a:r>
             <a:endParaRPr lang="en-US" dirty="0">
               <a:solidFill>
@@ -6751,7 +6778,7 @@
       </p:sp>
       <p:sp>
         <p:nvSpPr>
-          <p:cNvPr id="3" name="Content Placeholder 2"/>
+          <p:cNvPr id="2" name="Content Placeholder 1"/>
           <p:cNvSpPr>
             <a:spLocks noGrp="1"/>
           </p:cNvSpPr>
@@ -6761,24 +6788,190 @@
         </p:nvSpPr>
         <p:spPr/>
         <p:txBody>
-          <a:bodyPr/>
+          <a:bodyPr numCol="2"/>
           <a:lstStyle/>
           <a:p>
+            <a:pPr marL="0" indent="0" algn="ctr">
+              <a:buNone/>
+            </a:pPr>
             <a:r>
               <a:rPr lang="en-US" dirty="0" err="1" smtClean="0">
                 <a:solidFill>
                   <a:schemeClr val="bg1"/>
                 </a:solidFill>
               </a:rPr>
-              <a:t>Auth</a:t>
-            </a:r>
+              <a:t>multer</a:t>
+            </a:r>
+            <a:endParaRPr lang="en-US" dirty="0" smtClean="0">
+              <a:solidFill>
+                <a:schemeClr val="bg1"/>
+              </a:solidFill>
+            </a:endParaRPr>
+          </a:p>
+          <a:p>
+            <a:pPr marL="0" indent="0" algn="ctr">
+              <a:buNone/>
+            </a:pPr>
+            <a:endParaRPr lang="en-US" dirty="0" smtClean="0">
+              <a:solidFill>
+                <a:schemeClr val="bg1"/>
+              </a:solidFill>
+            </a:endParaRPr>
+          </a:p>
+          <a:p>
+            <a:pPr marL="0" indent="0" algn="ctr">
+              <a:buNone/>
+            </a:pPr>
             <a:r>
               <a:rPr lang="en-US" dirty="0" smtClean="0">
                 <a:solidFill>
                   <a:schemeClr val="bg1"/>
                 </a:solidFill>
               </a:rPr>
-              <a:t>, validation, breaking routes down into readable chunks</a:t>
+              <a:t>cookie-parser</a:t>
+            </a:r>
+          </a:p>
+          <a:p>
+            <a:pPr marL="0" indent="0" algn="ctr">
+              <a:buNone/>
+            </a:pPr>
+            <a:endParaRPr lang="en-US" dirty="0" smtClean="0">
+              <a:solidFill>
+                <a:schemeClr val="bg1"/>
+              </a:solidFill>
+            </a:endParaRPr>
+          </a:p>
+          <a:p>
+            <a:pPr marL="0" indent="0" algn="ctr">
+              <a:buNone/>
+            </a:pPr>
+            <a:r>
+              <a:rPr lang="en-US" dirty="0" smtClean="0">
+                <a:solidFill>
+                  <a:schemeClr val="bg1"/>
+                </a:solidFill>
+              </a:rPr>
+              <a:t>cookie-session</a:t>
+            </a:r>
+          </a:p>
+          <a:p>
+            <a:pPr marL="0" indent="0" algn="ctr">
+              <a:buNone/>
+            </a:pPr>
+            <a:endParaRPr lang="en-US" dirty="0" smtClean="0">
+              <a:solidFill>
+                <a:schemeClr val="bg1"/>
+              </a:solidFill>
+            </a:endParaRPr>
+          </a:p>
+          <a:p>
+            <a:pPr marL="0" indent="0" algn="ctr">
+              <a:buNone/>
+            </a:pPr>
+            <a:r>
+              <a:rPr lang="en-US" dirty="0" err="1" smtClean="0">
+                <a:solidFill>
+                  <a:schemeClr val="bg1"/>
+                </a:solidFill>
+              </a:rPr>
+              <a:t>cors</a:t>
+            </a:r>
+            <a:endParaRPr lang="en-US" dirty="0" smtClean="0">
+              <a:solidFill>
+                <a:schemeClr val="bg1"/>
+              </a:solidFill>
+            </a:endParaRPr>
+          </a:p>
+          <a:p>
+            <a:pPr marL="0" indent="0" algn="ctr">
+              <a:buNone/>
+            </a:pPr>
+            <a:r>
+              <a:rPr lang="en-US" dirty="0" err="1" smtClean="0">
+                <a:solidFill>
+                  <a:schemeClr val="bg1"/>
+                </a:solidFill>
+              </a:rPr>
+              <a:t>express.static</a:t>
+            </a:r>
+            <a:endParaRPr lang="en-US" dirty="0" smtClean="0">
+              <a:solidFill>
+                <a:schemeClr val="bg1"/>
+              </a:solidFill>
+            </a:endParaRPr>
+          </a:p>
+          <a:p>
+            <a:pPr marL="0" indent="0" algn="ctr">
+              <a:buNone/>
+            </a:pPr>
+            <a:endParaRPr lang="en-US" dirty="0" smtClean="0">
+              <a:solidFill>
+                <a:schemeClr val="bg1"/>
+              </a:solidFill>
+            </a:endParaRPr>
+          </a:p>
+          <a:p>
+            <a:pPr marL="0" indent="0" algn="ctr">
+              <a:buNone/>
+            </a:pPr>
+            <a:r>
+              <a:rPr lang="en-US" dirty="0" smtClean="0">
+                <a:solidFill>
+                  <a:schemeClr val="bg1"/>
+                </a:solidFill>
+              </a:rPr>
+              <a:t>timeout</a:t>
+            </a:r>
+          </a:p>
+          <a:p>
+            <a:pPr marL="0" indent="0" algn="ctr">
+              <a:buNone/>
+            </a:pPr>
+            <a:endParaRPr lang="en-US" dirty="0" smtClean="0">
+              <a:solidFill>
+                <a:schemeClr val="bg1"/>
+              </a:solidFill>
+            </a:endParaRPr>
+          </a:p>
+          <a:p>
+            <a:pPr marL="0" indent="0" algn="ctr">
+              <a:buNone/>
+            </a:pPr>
+            <a:r>
+              <a:rPr lang="en-US" dirty="0" err="1" smtClean="0">
+                <a:solidFill>
+                  <a:schemeClr val="bg1"/>
+                </a:solidFill>
+              </a:rPr>
+              <a:t>morgan</a:t>
+            </a:r>
+            <a:endParaRPr lang="en-US" dirty="0" smtClean="0">
+              <a:solidFill>
+                <a:schemeClr val="bg1"/>
+              </a:solidFill>
+            </a:endParaRPr>
+          </a:p>
+          <a:p>
+            <a:pPr marL="0" indent="0" algn="ctr">
+              <a:buNone/>
+            </a:pPr>
+            <a:endParaRPr lang="en-US" dirty="0" smtClean="0">
+              <a:solidFill>
+                <a:schemeClr val="bg1"/>
+              </a:solidFill>
+            </a:endParaRPr>
+          </a:p>
+          <a:p>
+            <a:pPr marL="0" indent="0" algn="ctr">
+              <a:buNone/>
+            </a:pPr>
+            <a:r>
+              <a:rPr lang="en-US" dirty="0" smtClean="0">
+                <a:solidFill>
+                  <a:schemeClr val="bg1"/>
+                </a:solidFill>
+              </a:rPr>
+              <a:t>passport</a:t>
             </a:r>
             <a:endParaRPr lang="en-US" dirty="0">
               <a:solidFill>
@@ -6821,7 +7014,7 @@
     </p:spTree>
     <p:extLst>
       <p:ext uri="{BB962C8B-B14F-4D97-AF65-F5344CB8AC3E}">
-        <p14:creationId xmlns:p14="http://schemas.microsoft.com/office/powerpoint/2010/main" val="284791290"/>
+        <p14:creationId xmlns:p14="http://schemas.microsoft.com/office/powerpoint/2010/main" val="2741370788"/>
       </p:ext>
     </p:extLst>
   </p:cSld>
@@ -6886,38 +7079,7 @@
                   <a:schemeClr val="bg1"/>
                 </a:solidFill>
               </a:rPr>
-              <a:t>Router</a:t>
-            </a:r>
-            <a:endParaRPr lang="en-US" dirty="0">
-              <a:solidFill>
-                <a:schemeClr val="bg1"/>
-              </a:solidFill>
-            </a:endParaRPr>
-          </a:p>
-        </p:txBody>
-      </p:sp>
-      <p:sp>
-        <p:nvSpPr>
-          <p:cNvPr id="3" name="Content Placeholder 2"/>
-          <p:cNvSpPr>
-            <a:spLocks noGrp="1"/>
-          </p:cNvSpPr>
-          <p:nvPr>
-            <p:ph idx="1"/>
-          </p:nvPr>
-        </p:nvSpPr>
-        <p:spPr/>
-        <p:txBody>
-          <a:bodyPr/>
-          <a:lstStyle/>
-          <a:p>
-            <a:r>
-              <a:rPr lang="en-US" dirty="0" smtClean="0">
-                <a:solidFill>
-                  <a:schemeClr val="bg1"/>
-                </a:solidFill>
-              </a:rPr>
-              <a:t>Using the express router to make it neater</a:t>
+              <a:t>Static content made easy</a:t>
             </a:r>
             <a:endParaRPr lang="en-US" dirty="0">
               <a:solidFill>
@@ -6957,10 +7119,64 @@
           </a:prstGeom>
         </p:spPr>
       </p:pic>
+      <p:pic>
+        <p:nvPicPr>
+          <p:cNvPr id="3075" name="Picture 3"/>
+          <p:cNvPicPr>
+            <a:picLocks noChangeAspect="1" noChangeArrowheads="1"/>
+          </p:cNvPicPr>
+          <p:nvPr/>
+        </p:nvPicPr>
+        <p:blipFill>
+          <a:blip r:embed="rId3">
+            <a:extLst>
+              <a:ext uri="{28A0092B-C50C-407E-A947-70E740481C1C}">
+                <a14:useLocalDpi xmlns:a14="http://schemas.microsoft.com/office/drawing/2010/main" val="0"/>
+              </a:ext>
+            </a:extLst>
+          </a:blip>
+          <a:srcRect/>
+          <a:stretch>
+            <a:fillRect/>
+          </a:stretch>
+        </p:blipFill>
+        <p:spPr bwMode="auto">
+          <a:xfrm>
+            <a:off x="481013" y="2614613"/>
+            <a:ext cx="8181975" cy="1628775"/>
+          </a:xfrm>
+          <a:prstGeom prst="rect">
+            <a:avLst/>
+          </a:prstGeom>
+          <a:noFill/>
+          <a:ln>
+            <a:noFill/>
+          </a:ln>
+          <a:extLst>
+            <a:ext uri="{909E8E84-426E-40DD-AFC4-6F175D3DCCD1}">
+              <a14:hiddenFill xmlns:a14="http://schemas.microsoft.com/office/drawing/2010/main">
+                <a:solidFill>
+                  <a:schemeClr val="accent1"/>
+                </a:solidFill>
+              </a14:hiddenFill>
+            </a:ext>
+            <a:ext uri="{91240B29-F687-4F45-9708-019B960494DF}">
+              <a14:hiddenLine xmlns:a14="http://schemas.microsoft.com/office/drawing/2010/main" w="9525">
+                <a:solidFill>
+                  <a:schemeClr val="tx1"/>
+                </a:solidFill>
+                <a:miter lim="800000"/>
+                <a:headEnd/>
+                <a:tailEnd/>
+              </a14:hiddenLine>
+            </a:ext>
+          </a:extLst>
+        </p:spPr>
+      </p:pic>
     </p:spTree>
     <p:extLst>
       <p:ext uri="{BB962C8B-B14F-4D97-AF65-F5344CB8AC3E}">
-        <p14:creationId xmlns:p14="http://schemas.microsoft.com/office/powerpoint/2010/main" val="352200715"/>
+        <p14:creationId xmlns:p14="http://schemas.microsoft.com/office/powerpoint/2010/main" val="597458270"/>
       </p:ext>
     </p:extLst>
   </p:cSld>
@@ -7025,70 +7241,7 @@
                   <a:schemeClr val="bg1"/>
                 </a:solidFill>
               </a:rPr>
-              <a:t>Serving up static content</a:t>
-            </a:r>
-            <a:endParaRPr lang="en-US" dirty="0">
-              <a:solidFill>
-                <a:schemeClr val="bg1"/>
-              </a:solidFill>
-            </a:endParaRPr>
-          </a:p>
-        </p:txBody>
-      </p:sp>
-      <p:sp>
-        <p:nvSpPr>
-          <p:cNvPr id="3" name="Content Placeholder 2"/>
-          <p:cNvSpPr>
-            <a:spLocks noGrp="1"/>
-          </p:cNvSpPr>
-          <p:nvPr>
-            <p:ph idx="1"/>
-          </p:nvPr>
-        </p:nvSpPr>
-        <p:spPr/>
-        <p:txBody>
-          <a:bodyPr/>
-          <a:lstStyle/>
-          <a:p>
-            <a:r>
-              <a:rPr lang="en-US" dirty="0" smtClean="0">
-                <a:solidFill>
-                  <a:schemeClr val="bg1"/>
-                </a:solidFill>
-              </a:rPr>
-              <a:t>How to serve static assets (like /</a:t>
-            </a:r>
-            <a:r>
-              <a:rPr lang="en-US" dirty="0" err="1" smtClean="0">
-                <a:solidFill>
-                  <a:schemeClr val="bg1"/>
-                </a:solidFill>
-              </a:rPr>
-              <a:t>js</a:t>
-            </a:r>
-            <a:r>
-              <a:rPr lang="en-US" dirty="0" smtClean="0">
-                <a:solidFill>
-                  <a:schemeClr val="bg1"/>
-                </a:solidFill>
-              </a:rPr>
-              <a:t>/</a:t>
-            </a:r>
-            <a:r>
-              <a:rPr lang="en-US" dirty="0" err="1" smtClean="0">
-                <a:solidFill>
-                  <a:schemeClr val="bg1"/>
-                </a:solidFill>
-              </a:rPr>
-              <a:t>css</a:t>
-            </a:r>
-            <a:r>
-              <a:rPr lang="en-US" dirty="0" smtClean="0">
-                <a:solidFill>
-                  <a:schemeClr val="bg1"/>
-                </a:solidFill>
-              </a:rPr>
-              <a:t>)</a:t>
+              <a:t>Template engines</a:t>
             </a:r>
             <a:endParaRPr lang="en-US" dirty="0">
               <a:solidFill>
@@ -7128,10 +7281,252 @@
           </a:prstGeom>
         </p:spPr>
       </p:pic>
+      <p:sp>
+        <p:nvSpPr>
+          <p:cNvPr id="2" name="AutoShape 2" descr="https://camo.githubusercontent.com/a43de8ca816e78b1c2666f7696f449b2eeddbeca/68747470733a2f2f63646e2e7261776769742e636f6d2f7075676a732f7075672d6c6f676f2f656563343336636565386664396431373236643738333963626539396431663639343639326330632f5356472f7075672d66696e616c2d6c6f676f2d5f2d636f6c6f75722d3132382e737667"/>
+          <p:cNvSpPr>
+            <a:spLocks noChangeAspect="1" noChangeArrowheads="1"/>
+          </p:cNvSpPr>
+          <p:nvPr/>
+        </p:nvSpPr>
+        <p:spPr bwMode="auto">
+          <a:xfrm>
+            <a:off x="155575" y="-144463"/>
+            <a:ext cx="304800" cy="304801"/>
+          </a:xfrm>
+          <a:prstGeom prst="rect">
+            <a:avLst/>
+          </a:prstGeom>
+          <a:noFill/>
+          <a:extLst>
+            <a:ext uri="{909E8E84-426E-40DD-AFC4-6F175D3DCCD1}">
+              <a14:hiddenFill xmlns:a14="http://schemas.microsoft.com/office/drawing/2010/main">
+                <a:solidFill>
+                  <a:srgbClr val="FFFFFF"/>
+                </a:solidFill>
+              </a14:hiddenFill>
+            </a:ext>
+          </a:extLst>
+        </p:spPr>
+        <p:txBody>
+          <a:bodyPr vert="horz" wrap="square" lIns="91440" tIns="45720" rIns="91440" bIns="45720" numCol="1" anchor="t" anchorCtr="0" compatLnSpc="1">
+            <a:prstTxWarp prst="textNoShape">
+              <a:avLst/>
+            </a:prstTxWarp>
+          </a:bodyPr>
+          <a:lstStyle/>
+          <a:p>
+            <a:endParaRPr lang="en-US"/>
+          </a:p>
+        </p:txBody>
+      </p:sp>
+      <p:sp>
+        <p:nvSpPr>
+          <p:cNvPr id="3" name="AutoShape 4" descr="https://camo.githubusercontent.com/a43de8ca816e78b1c2666f7696f449b2eeddbeca/68747470733a2f2f63646e2e7261776769742e636f6d2f7075676a732f7075672d6c6f676f2f656563343336636565386664396431373236643738333963626539396431663639343639326330632f5356472f7075672d66696e616c2d6c6f676f2d5f2d636f6c6f75722d3132382e737667"/>
+          <p:cNvSpPr>
+            <a:spLocks noChangeAspect="1" noChangeArrowheads="1"/>
+          </p:cNvSpPr>
+          <p:nvPr/>
+        </p:nvSpPr>
+        <p:spPr bwMode="auto">
+          <a:xfrm>
+            <a:off x="307975" y="7937"/>
+            <a:ext cx="304800" cy="304801"/>
+          </a:xfrm>
+          <a:prstGeom prst="rect">
+            <a:avLst/>
+          </a:prstGeom>
+          <a:noFill/>
+          <a:extLst>
+            <a:ext uri="{909E8E84-426E-40DD-AFC4-6F175D3DCCD1}">
+              <a14:hiddenFill xmlns:a14="http://schemas.microsoft.com/office/drawing/2010/main">
+                <a:solidFill>
+                  <a:srgbClr val="FFFFFF"/>
+                </a:solidFill>
+              </a14:hiddenFill>
+            </a:ext>
+          </a:extLst>
+        </p:spPr>
+        <p:txBody>
+          <a:bodyPr vert="horz" wrap="square" lIns="91440" tIns="45720" rIns="91440" bIns="45720" numCol="1" anchor="t" anchorCtr="0" compatLnSpc="1">
+            <a:prstTxWarp prst="textNoShape">
+              <a:avLst/>
+            </a:prstTxWarp>
+          </a:bodyPr>
+          <a:lstStyle/>
+          <a:p>
+            <a:endParaRPr lang="en-US"/>
+          </a:p>
+        </p:txBody>
+      </p:sp>
+      <p:pic>
+        <p:nvPicPr>
+          <p:cNvPr id="1030" name="Picture 6" descr="Image result for pugjs"/>
+          <p:cNvPicPr>
+            <a:picLocks noChangeAspect="1" noChangeArrowheads="1"/>
+          </p:cNvPicPr>
+          <p:nvPr/>
+        </p:nvPicPr>
+        <p:blipFill>
+          <a:blip r:embed="rId3" cstate="print">
+            <a:extLst>
+              <a:ext uri="{28A0092B-C50C-407E-A947-70E740481C1C}">
+                <a14:useLocalDpi xmlns:a14="http://schemas.microsoft.com/office/drawing/2010/main" val="0"/>
+              </a:ext>
+            </a:extLst>
+          </a:blip>
+          <a:srcRect/>
+          <a:stretch>
+            <a:fillRect/>
+          </a:stretch>
+        </p:blipFill>
+        <p:spPr bwMode="auto">
+          <a:xfrm>
+            <a:off x="6400800" y="2283552"/>
+            <a:ext cx="2136611" cy="2136611"/>
+          </a:xfrm>
+          <a:prstGeom prst="rect">
+            <a:avLst/>
+          </a:prstGeom>
+          <a:noFill/>
+          <a:extLst>
+            <a:ext uri="{909E8E84-426E-40DD-AFC4-6F175D3DCCD1}">
+              <a14:hiddenFill xmlns:a14="http://schemas.microsoft.com/office/drawing/2010/main">
+                <a:solidFill>
+                  <a:srgbClr val="FFFFFF"/>
+                </a:solidFill>
+              </a14:hiddenFill>
+            </a:ext>
+          </a:extLst>
+        </p:spPr>
+      </p:pic>
+      <p:pic>
+        <p:nvPicPr>
+          <p:cNvPr id="1032" name="Picture 8" descr="Image result for handlebars js"/>
+          <p:cNvPicPr>
+            <a:picLocks noChangeAspect="1" noChangeArrowheads="1"/>
+          </p:cNvPicPr>
+          <p:nvPr/>
+        </p:nvPicPr>
+        <p:blipFill>
+          <a:blip r:embed="rId4">
+            <a:extLst>
+              <a:ext uri="{28A0092B-C50C-407E-A947-70E740481C1C}">
+                <a14:useLocalDpi xmlns:a14="http://schemas.microsoft.com/office/drawing/2010/main" val="0"/>
+              </a:ext>
+            </a:extLst>
+          </a:blip>
+          <a:srcRect/>
+          <a:stretch>
+            <a:fillRect/>
+          </a:stretch>
+        </p:blipFill>
+        <p:spPr bwMode="auto">
+          <a:xfrm>
+            <a:off x="762000" y="2588916"/>
+            <a:ext cx="2022682" cy="1525884"/>
+          </a:xfrm>
+          <a:prstGeom prst="rect">
+            <a:avLst/>
+          </a:prstGeom>
+          <a:noFill/>
+          <a:extLst>
+            <a:ext uri="{909E8E84-426E-40DD-AFC4-6F175D3DCCD1}">
+              <a14:hiddenFill xmlns:a14="http://schemas.microsoft.com/office/drawing/2010/main">
+                <a:solidFill>
+                  <a:srgbClr val="FFFFFF"/>
+                </a:solidFill>
+              </a14:hiddenFill>
+            </a:ext>
+          </a:extLst>
+        </p:spPr>
+      </p:pic>
+      <p:pic>
+        <p:nvPicPr>
+          <p:cNvPr id="1034" name="Picture 10" descr="Image result for dust js"/>
+          <p:cNvPicPr>
+            <a:picLocks noChangeAspect="1" noChangeArrowheads="1"/>
+          </p:cNvPicPr>
+          <p:nvPr/>
+        </p:nvPicPr>
+        <p:blipFill>
+          <a:blip r:embed="rId5">
+            <a:extLst>
+              <a:ext uri="{28A0092B-C50C-407E-A947-70E740481C1C}">
+                <a14:useLocalDpi xmlns:a14="http://schemas.microsoft.com/office/drawing/2010/main" val="0"/>
+              </a:ext>
+            </a:extLst>
+          </a:blip>
+          <a:srcRect/>
+          <a:stretch>
+            <a:fillRect/>
+          </a:stretch>
+        </p:blipFill>
+        <p:spPr bwMode="auto">
+          <a:xfrm>
+            <a:off x="3219448" y="838200"/>
+            <a:ext cx="2724152" cy="2724152"/>
+          </a:xfrm>
+          <a:prstGeom prst="rect">
+            <a:avLst/>
+          </a:prstGeom>
+          <a:noFill/>
+          <a:extLst>
+            <a:ext uri="{909E8E84-426E-40DD-AFC4-6F175D3DCCD1}">
+              <a14:hiddenFill xmlns:a14="http://schemas.microsoft.com/office/drawing/2010/main">
+                <a:solidFill>
+                  <a:srgbClr val="FFFFFF"/>
+                </a:solidFill>
+              </a14:hiddenFill>
+            </a:ext>
+          </a:extLst>
+        </p:spPr>
+      </p:pic>
+      <p:pic>
+        <p:nvPicPr>
+          <p:cNvPr id="1026" name="Picture 2" descr="doT.js"/>
+          <p:cNvPicPr>
+            <a:picLocks noChangeAspect="1" noChangeArrowheads="1"/>
+          </p:cNvPicPr>
+          <p:nvPr/>
+        </p:nvPicPr>
+        <p:blipFill>
+          <a:blip r:embed="rId6">
+            <a:extLst>
+              <a:ext uri="{28A0092B-C50C-407E-A947-70E740481C1C}">
+                <a14:useLocalDpi xmlns:a14="http://schemas.microsoft.com/office/drawing/2010/main" val="0"/>
+              </a:ext>
+            </a:extLst>
+          </a:blip>
+          <a:srcRect/>
+          <a:stretch>
+            <a:fillRect/>
+          </a:stretch>
+        </p:blipFill>
+        <p:spPr bwMode="auto">
+          <a:xfrm>
+            <a:off x="3629024" y="4038600"/>
+            <a:ext cx="1905000" cy="1905000"/>
+          </a:xfrm>
+          <a:prstGeom prst="rect">
+            <a:avLst/>
+          </a:prstGeom>
+          <a:noFill/>
+          <a:extLst>
+            <a:ext uri="{909E8E84-426E-40DD-AFC4-6F175D3DCCD1}">
+              <a14:hiddenFill xmlns:a14="http://schemas.microsoft.com/office/drawing/2010/main">
+                <a:solidFill>
+                  <a:srgbClr val="FFFFFF"/>
+                </a:solidFill>
+              </a14:hiddenFill>
+            </a:ext>
+          </a:extLst>
+        </p:spPr>
+      </p:pic>
     </p:spTree>
     <p:extLst>
       <p:ext uri="{BB962C8B-B14F-4D97-AF65-F5344CB8AC3E}">
-        <p14:creationId xmlns:p14="http://schemas.microsoft.com/office/powerpoint/2010/main" val="597458270"/>
+        <p14:creationId xmlns:p14="http://schemas.microsoft.com/office/powerpoint/2010/main" val="2217117069"/>
       </p:ext>
     </p:extLst>
   </p:cSld>
@@ -7196,7 +7591,7 @@
                   <a:schemeClr val="bg1"/>
                 </a:solidFill>
               </a:rPr>
-              <a:t>Template engines</a:t>
+              <a:t>Serving up templates</a:t>
             </a:r>
             <a:endParaRPr lang="en-US" dirty="0">
               <a:solidFill>
@@ -7236,94 +7631,16 @@
           </a:prstGeom>
         </p:spPr>
       </p:pic>
-      <p:sp>
-        <p:nvSpPr>
-          <p:cNvPr id="2" name="AutoShape 2" descr="https://camo.githubusercontent.com/a43de8ca816e78b1c2666f7696f449b2eeddbeca/68747470733a2f2f63646e2e7261776769742e636f6d2f7075676a732f7075672d6c6f676f2f656563343336636565386664396431373236643738333963626539396431663639343639326330632f5356472f7075672d66696e616c2d6c6f676f2d5f2d636f6c6f75722d3132382e737667"/>
-          <p:cNvSpPr>
-            <a:spLocks noChangeAspect="1" noChangeArrowheads="1"/>
-          </p:cNvSpPr>
-          <p:nvPr/>
-        </p:nvSpPr>
-        <p:spPr bwMode="auto">
-          <a:xfrm>
-            <a:off x="155575" y="-144463"/>
-            <a:ext cx="304800" cy="304801"/>
-          </a:xfrm>
-          <a:prstGeom prst="rect">
-            <a:avLst/>
-          </a:prstGeom>
-          <a:noFill/>
-          <a:extLst>
-            <a:ext uri="{909E8E84-426E-40DD-AFC4-6F175D3DCCD1}">
-              <a14:hiddenFill xmlns:a14="http://schemas.microsoft.com/office/drawing/2010/main">
-                <a:solidFill>
-                  <a:srgbClr val="FFFFFF"/>
-                </a:solidFill>
-              </a14:hiddenFill>
-            </a:ext>
-          </a:extLst>
-        </p:spPr>
-        <p:txBody>
-          <a:bodyPr vert="horz" wrap="square" lIns="91440" tIns="45720" rIns="91440" bIns="45720" numCol="1" anchor="t" anchorCtr="0" compatLnSpc="1">
-            <a:prstTxWarp prst="textNoShape">
-              <a:avLst/>
-            </a:prstTxWarp>
-          </a:bodyPr>
-          <a:lstStyle/>
-          <a:p>
-            <a:endParaRPr lang="en-US"/>
-          </a:p>
-        </p:txBody>
-      </p:sp>
-      <p:sp>
-        <p:nvSpPr>
-          <p:cNvPr id="3" name="AutoShape 4" descr="https://camo.githubusercontent.com/a43de8ca816e78b1c2666f7696f449b2eeddbeca/68747470733a2f2f63646e2e7261776769742e636f6d2f7075676a732f7075672d6c6f676f2f656563343336636565386664396431373236643738333963626539396431663639343639326330632f5356472f7075672d66696e616c2d6c6f676f2d5f2d636f6c6f75722d3132382e737667"/>
-          <p:cNvSpPr>
-            <a:spLocks noChangeAspect="1" noChangeArrowheads="1"/>
-          </p:cNvSpPr>
-          <p:nvPr/>
-        </p:nvSpPr>
-        <p:spPr bwMode="auto">
-          <a:xfrm>
-            <a:off x="307975" y="7937"/>
-            <a:ext cx="304800" cy="304801"/>
-          </a:xfrm>
-          <a:prstGeom prst="rect">
-            <a:avLst/>
-          </a:prstGeom>
-          <a:noFill/>
-          <a:extLst>
-            <a:ext uri="{909E8E84-426E-40DD-AFC4-6F175D3DCCD1}">
-              <a14:hiddenFill xmlns:a14="http://schemas.microsoft.com/office/drawing/2010/main">
-                <a:solidFill>
-                  <a:srgbClr val="FFFFFF"/>
-                </a:solidFill>
-              </a14:hiddenFill>
-            </a:ext>
-          </a:extLst>
-        </p:spPr>
-        <p:txBody>
-          <a:bodyPr vert="horz" wrap="square" lIns="91440" tIns="45720" rIns="91440" bIns="45720" numCol="1" anchor="t" anchorCtr="0" compatLnSpc="1">
-            <a:prstTxWarp prst="textNoShape">
-              <a:avLst/>
-            </a:prstTxWarp>
-          </a:bodyPr>
-          <a:lstStyle/>
-          <a:p>
-            <a:endParaRPr lang="en-US"/>
-          </a:p>
-        </p:txBody>
-      </p:sp>
       <p:pic>
         <p:nvPicPr>
-          <p:cNvPr id="1030" name="Picture 6" descr="Image result for pugjs"/>
+          <p:cNvPr id="5122" name="Picture 2"/>
           <p:cNvPicPr>
             <a:picLocks noChangeAspect="1" noChangeArrowheads="1"/>
           </p:cNvPicPr>
           <p:nvPr/>
         </p:nvPicPr>
         <p:blipFill>
-          <a:blip r:embed="rId3" cstate="print">
+          <a:blip r:embed="rId3">
             <a:extLst>
               <a:ext uri="{28A0092B-C50C-407E-A947-70E740481C1C}">
                 <a14:useLocalDpi xmlns:a14="http://schemas.microsoft.com/office/drawing/2010/main" val="0"/>
@@ -7337,143 +7654,33 @@
         </p:blipFill>
         <p:spPr bwMode="auto">
           <a:xfrm>
-            <a:off x="6400800" y="2283552"/>
-            <a:ext cx="2136611" cy="2136611"/>
+            <a:off x="1457325" y="1295400"/>
+            <a:ext cx="6229350" cy="4829175"/>
           </a:xfrm>
           <a:prstGeom prst="rect">
             <a:avLst/>
           </a:prstGeom>
           <a:noFill/>
+          <a:ln>
+            <a:noFill/>
+          </a:ln>
           <a:extLst>
             <a:ext uri="{909E8E84-426E-40DD-AFC4-6F175D3DCCD1}">
               <a14:hiddenFill xmlns:a14="http://schemas.microsoft.com/office/drawing/2010/main">
                 <a:solidFill>
-                  <a:srgbClr val="FFFFFF"/>
+                  <a:schemeClr val="accent1"/>
                 </a:solidFill>
               </a14:hiddenFill>
             </a:ext>
-          </a:extLst>
-        </p:spPr>
-      </p:pic>
-      <p:pic>
-        <p:nvPicPr>
-          <p:cNvPr id="1032" name="Picture 8" descr="Image result for handlebars js"/>
-          <p:cNvPicPr>
-            <a:picLocks noChangeAspect="1" noChangeArrowheads="1"/>
-          </p:cNvPicPr>
-          <p:nvPr/>
-        </p:nvPicPr>
-        <p:blipFill>
-          <a:blip r:embed="rId4">
-            <a:extLst>
-              <a:ext uri="{28A0092B-C50C-407E-A947-70E740481C1C}">
-                <a14:useLocalDpi xmlns:a14="http://schemas.microsoft.com/office/drawing/2010/main" val="0"/>
-              </a:ext>
-            </a:extLst>
-          </a:blip>
-          <a:srcRect/>
-          <a:stretch>
-            <a:fillRect/>
-          </a:stretch>
-        </p:blipFill>
-        <p:spPr bwMode="auto">
-          <a:xfrm>
-            <a:off x="762000" y="2588916"/>
-            <a:ext cx="2022682" cy="1525884"/>
-          </a:xfrm>
-          <a:prstGeom prst="rect">
-            <a:avLst/>
-          </a:prstGeom>
-          <a:noFill/>
-          <a:extLst>
-            <a:ext uri="{909E8E84-426E-40DD-AFC4-6F175D3DCCD1}">
-              <a14:hiddenFill xmlns:a14="http://schemas.microsoft.com/office/drawing/2010/main">
-                <a:solidFill>
-                  <a:srgbClr val="FFFFFF"/>
-                </a:solidFill>
-              </a14:hiddenFill>
-            </a:ext>
-          </a:extLst>
-        </p:spPr>
-      </p:pic>
-      <p:pic>
-        <p:nvPicPr>
-          <p:cNvPr id="1034" name="Picture 10" descr="Image result for dust js"/>
-          <p:cNvPicPr>
-            <a:picLocks noChangeAspect="1" noChangeArrowheads="1"/>
-          </p:cNvPicPr>
-          <p:nvPr/>
-        </p:nvPicPr>
-        <p:blipFill>
-          <a:blip r:embed="rId5">
-            <a:extLst>
-              <a:ext uri="{28A0092B-C50C-407E-A947-70E740481C1C}">
-                <a14:useLocalDpi xmlns:a14="http://schemas.microsoft.com/office/drawing/2010/main" val="0"/>
-              </a:ext>
-            </a:extLst>
-          </a:blip>
-          <a:srcRect/>
-          <a:stretch>
-            <a:fillRect/>
-          </a:stretch>
-        </p:blipFill>
-        <p:spPr bwMode="auto">
-          <a:xfrm>
-            <a:off x="3219448" y="838200"/>
-            <a:ext cx="2724152" cy="2724152"/>
-          </a:xfrm>
-          <a:prstGeom prst="rect">
-            <a:avLst/>
-          </a:prstGeom>
-          <a:noFill/>
-          <a:extLst>
-            <a:ext uri="{909E8E84-426E-40DD-AFC4-6F175D3DCCD1}">
-              <a14:hiddenFill xmlns:a14="http://schemas.microsoft.com/office/drawing/2010/main">
-                <a:solidFill>
-                  <a:srgbClr val="FFFFFF"/>
-                </a:solidFill>
-              </a14:hiddenFill>
-            </a:ext>
-          </a:extLst>
-        </p:spPr>
-      </p:pic>
-      <p:pic>
-        <p:nvPicPr>
-          <p:cNvPr id="1026" name="Picture 2" descr="doT.js"/>
-          <p:cNvPicPr>
-            <a:picLocks noChangeAspect="1" noChangeArrowheads="1"/>
-          </p:cNvPicPr>
-          <p:nvPr/>
-        </p:nvPicPr>
-        <p:blipFill>
-          <a:blip r:embed="rId6">
-            <a:extLst>
-              <a:ext uri="{28A0092B-C50C-407E-A947-70E740481C1C}">
-                <a14:useLocalDpi xmlns:a14="http://schemas.microsoft.com/office/drawing/2010/main" val="0"/>
-              </a:ext>
-            </a:extLst>
-          </a:blip>
-          <a:srcRect/>
-          <a:stretch>
-            <a:fillRect/>
-          </a:stretch>
-        </p:blipFill>
-        <p:spPr bwMode="auto">
-          <a:xfrm>
-            <a:off x="3629024" y="4191000"/>
-            <a:ext cx="1905000" cy="1905000"/>
-          </a:xfrm>
-          <a:prstGeom prst="rect">
-            <a:avLst/>
-          </a:prstGeom>
-          <a:noFill/>
-          <a:extLst>
-            <a:ext uri="{909E8E84-426E-40DD-AFC4-6F175D3DCCD1}">
-              <a14:hiddenFill xmlns:a14="http://schemas.microsoft.com/office/drawing/2010/main">
-                <a:solidFill>
-                  <a:srgbClr val="FFFFFF"/>
-                </a:solidFill>
-              </a14:hiddenFill>
+            <a:ext uri="{91240B29-F687-4F45-9708-019B960494DF}">
+              <a14:hiddenLine xmlns:a14="http://schemas.microsoft.com/office/drawing/2010/main" w="9525">
+                <a:solidFill>
+                  <a:schemeClr val="tx1"/>
+                </a:solidFill>
+                <a:miter lim="800000"/>
+                <a:headEnd/>
+                <a:tailEnd/>
+              </a14:hiddenLine>
             </a:ext>
           </a:extLst>
         </p:spPr>
@@ -7481,7 +7688,7 @@
     </p:spTree>
     <p:extLst>
       <p:ext uri="{BB962C8B-B14F-4D97-AF65-F5344CB8AC3E}">
-        <p14:creationId xmlns:p14="http://schemas.microsoft.com/office/powerpoint/2010/main" val="2217117069"/>
+        <p14:creationId xmlns:p14="http://schemas.microsoft.com/office/powerpoint/2010/main" val="742771758"/>
       </p:ext>
     </p:extLst>
   </p:cSld>
@@ -7546,7 +7753,7 @@
                   <a:schemeClr val="bg1"/>
                 </a:solidFill>
               </a:rPr>
-              <a:t>Serving up templates</a:t>
+              <a:t>Databases</a:t>
             </a:r>
             <a:endParaRPr lang="en-US" dirty="0">
               <a:solidFill>
@@ -7588,7 +7795,7 @@
       </p:pic>
       <p:pic>
         <p:nvPicPr>
-          <p:cNvPr id="5122" name="Picture 2"/>
+          <p:cNvPr id="3074" name="Picture 2" descr="Knex.js"/>
           <p:cNvPicPr>
             <a:picLocks noChangeAspect="1" noChangeArrowheads="1"/>
           </p:cNvPicPr>
@@ -7609,33 +7816,348 @@
         </p:blipFill>
         <p:spPr bwMode="auto">
           <a:xfrm>
-            <a:off x="1457325" y="1295400"/>
-            <a:ext cx="6229350" cy="4829175"/>
+            <a:off x="1419104" y="2609851"/>
+            <a:ext cx="6181725" cy="2209801"/>
           </a:xfrm>
           <a:prstGeom prst="rect">
             <a:avLst/>
           </a:prstGeom>
           <a:noFill/>
-          <a:ln>
-            <a:noFill/>
-          </a:ln>
           <a:extLst>
             <a:ext uri="{909E8E84-426E-40DD-AFC4-6F175D3DCCD1}">
               <a14:hiddenFill xmlns:a14="http://schemas.microsoft.com/office/drawing/2010/main">
                 <a:solidFill>
-                  <a:schemeClr val="accent1"/>
+                  <a:srgbClr val="FFFFFF"/>
                 </a:solidFill>
               </a14:hiddenFill>
             </a:ext>
-            <a:ext uri="{91240B29-F687-4F45-9708-019B960494DF}">
-              <a14:hiddenLine xmlns:a14="http://schemas.microsoft.com/office/drawing/2010/main" w="9525">
-                <a:solidFill>
-                  <a:schemeClr val="tx1"/>
-                </a:solidFill>
-                <a:miter lim="800000"/>
-                <a:headEnd/>
-                <a:tailEnd/>
-              </a14:hiddenLine>
+          </a:extLst>
+        </p:spPr>
+      </p:pic>
+      <p:pic>
+        <p:nvPicPr>
+          <p:cNvPr id="3076" name="Picture 4" descr="Image result for mongoose js"/>
+          <p:cNvPicPr>
+            <a:picLocks noChangeAspect="1" noChangeArrowheads="1"/>
+          </p:cNvPicPr>
+          <p:nvPr/>
+        </p:nvPicPr>
+        <p:blipFill>
+          <a:blip r:embed="rId4">
+            <a:extLst>
+              <a:ext uri="{28A0092B-C50C-407E-A947-70E740481C1C}">
+                <a14:useLocalDpi xmlns:a14="http://schemas.microsoft.com/office/drawing/2010/main" val="0"/>
+              </a:ext>
+            </a:extLst>
+          </a:blip>
+          <a:srcRect/>
+          <a:stretch>
+            <a:fillRect/>
+          </a:stretch>
+        </p:blipFill>
+        <p:spPr bwMode="auto">
+          <a:xfrm>
+            <a:off x="609600" y="1174780"/>
+            <a:ext cx="1973580" cy="1066800"/>
+          </a:xfrm>
+          <a:prstGeom prst="rect">
+            <a:avLst/>
+          </a:prstGeom>
+          <a:noFill/>
+          <a:extLst>
+            <a:ext uri="{909E8E84-426E-40DD-AFC4-6F175D3DCCD1}">
+              <a14:hiddenFill xmlns:a14="http://schemas.microsoft.com/office/drawing/2010/main">
+                <a:solidFill>
+                  <a:srgbClr val="FFFFFF"/>
+                </a:solidFill>
+              </a14:hiddenFill>
+            </a:ext>
+          </a:extLst>
+        </p:spPr>
+      </p:pic>
+      <p:pic>
+        <p:nvPicPr>
+          <p:cNvPr id="3078" name="Picture 6" descr="Image result for mongoose js"/>
+          <p:cNvPicPr>
+            <a:picLocks noChangeAspect="1" noChangeArrowheads="1"/>
+          </p:cNvPicPr>
+          <p:nvPr/>
+        </p:nvPicPr>
+        <p:blipFill>
+          <a:blip r:embed="rId5" cstate="print">
+            <a:extLst>
+              <a:ext uri="{28A0092B-C50C-407E-A947-70E740481C1C}">
+                <a14:useLocalDpi xmlns:a14="http://schemas.microsoft.com/office/drawing/2010/main" val="0"/>
+              </a:ext>
+            </a:extLst>
+          </a:blip>
+          <a:srcRect/>
+          <a:stretch>
+            <a:fillRect/>
+          </a:stretch>
+        </p:blipFill>
+        <p:spPr bwMode="auto">
+          <a:xfrm>
+            <a:off x="397856" y="5670490"/>
+            <a:ext cx="683868" cy="683868"/>
+          </a:xfrm>
+          <a:prstGeom prst="rect">
+            <a:avLst/>
+          </a:prstGeom>
+          <a:noFill/>
+          <a:extLst>
+            <a:ext uri="{909E8E84-426E-40DD-AFC4-6F175D3DCCD1}">
+              <a14:hiddenFill xmlns:a14="http://schemas.microsoft.com/office/drawing/2010/main">
+                <a:solidFill>
+                  <a:srgbClr val="FFFFFF"/>
+                </a:solidFill>
+              </a14:hiddenFill>
+            </a:ext>
+          </a:extLst>
+        </p:spPr>
+      </p:pic>
+      <p:pic>
+        <p:nvPicPr>
+          <p:cNvPr id="3080" name="Picture 8" descr="Image result for sequelize"/>
+          <p:cNvPicPr>
+            <a:picLocks noChangeAspect="1" noChangeArrowheads="1"/>
+          </p:cNvPicPr>
+          <p:nvPr/>
+        </p:nvPicPr>
+        <p:blipFill>
+          <a:blip r:embed="rId6">
+            <a:extLst>
+              <a:ext uri="{28A0092B-C50C-407E-A947-70E740481C1C}">
+                <a14:useLocalDpi xmlns:a14="http://schemas.microsoft.com/office/drawing/2010/main" val="0"/>
+              </a:ext>
+            </a:extLst>
+          </a:blip>
+          <a:srcRect/>
+          <a:stretch>
+            <a:fillRect/>
+          </a:stretch>
+        </p:blipFill>
+        <p:spPr bwMode="auto">
+          <a:xfrm>
+            <a:off x="4074319" y="1219200"/>
+            <a:ext cx="2819400" cy="1314451"/>
+          </a:xfrm>
+          <a:prstGeom prst="rect">
+            <a:avLst/>
+          </a:prstGeom>
+          <a:noFill/>
+          <a:extLst>
+            <a:ext uri="{909E8E84-426E-40DD-AFC4-6F175D3DCCD1}">
+              <a14:hiddenFill xmlns:a14="http://schemas.microsoft.com/office/drawing/2010/main">
+                <a:solidFill>
+                  <a:srgbClr val="FFFFFF"/>
+                </a:solidFill>
+              </a14:hiddenFill>
+            </a:ext>
+          </a:extLst>
+        </p:spPr>
+      </p:pic>
+      <p:pic>
+        <p:nvPicPr>
+          <p:cNvPr id="3082" name="Picture 10" descr="Image result for couchdb"/>
+          <p:cNvPicPr>
+            <a:picLocks noChangeAspect="1" noChangeArrowheads="1"/>
+          </p:cNvPicPr>
+          <p:nvPr/>
+        </p:nvPicPr>
+        <p:blipFill>
+          <a:blip r:embed="rId7">
+            <a:extLst>
+              <a:ext uri="{28A0092B-C50C-407E-A947-70E740481C1C}">
+                <a14:useLocalDpi xmlns:a14="http://schemas.microsoft.com/office/drawing/2010/main" val="0"/>
+              </a:ext>
+            </a:extLst>
+          </a:blip>
+          <a:srcRect/>
+          <a:stretch>
+            <a:fillRect/>
+          </a:stretch>
+        </p:blipFill>
+        <p:spPr bwMode="auto">
+          <a:xfrm>
+            <a:off x="5029200" y="5713797"/>
+            <a:ext cx="795917" cy="687003"/>
+          </a:xfrm>
+          <a:prstGeom prst="rect">
+            <a:avLst/>
+          </a:prstGeom>
+          <a:noFill/>
+          <a:extLst>
+            <a:ext uri="{909E8E84-426E-40DD-AFC4-6F175D3DCCD1}">
+              <a14:hiddenFill xmlns:a14="http://schemas.microsoft.com/office/drawing/2010/main">
+                <a:solidFill>
+                  <a:srgbClr val="FFFFFF"/>
+                </a:solidFill>
+              </a14:hiddenFill>
+            </a:ext>
+          </a:extLst>
+        </p:spPr>
+      </p:pic>
+      <p:pic>
+        <p:nvPicPr>
+          <p:cNvPr id="3084" name="Picture 12" descr="Image result for neo4j logo"/>
+          <p:cNvPicPr>
+            <a:picLocks noChangeAspect="1" noChangeArrowheads="1"/>
+          </p:cNvPicPr>
+          <p:nvPr/>
+        </p:nvPicPr>
+        <p:blipFill>
+          <a:blip r:embed="rId8" cstate="print">
+            <a:extLst>
+              <a:ext uri="{28A0092B-C50C-407E-A947-70E740481C1C}">
+                <a14:useLocalDpi xmlns:a14="http://schemas.microsoft.com/office/drawing/2010/main" val="0"/>
+              </a:ext>
+            </a:extLst>
+          </a:blip>
+          <a:srcRect/>
+          <a:stretch>
+            <a:fillRect/>
+          </a:stretch>
+        </p:blipFill>
+        <p:spPr bwMode="auto">
+          <a:xfrm>
+            <a:off x="1524000" y="5750399"/>
+            <a:ext cx="1343675" cy="537469"/>
+          </a:xfrm>
+          <a:prstGeom prst="rect">
+            <a:avLst/>
+          </a:prstGeom>
+          <a:noFill/>
+          <a:extLst>
+            <a:ext uri="{909E8E84-426E-40DD-AFC4-6F175D3DCCD1}">
+              <a14:hiddenFill xmlns:a14="http://schemas.microsoft.com/office/drawing/2010/main">
+                <a:solidFill>
+                  <a:srgbClr val="FFFFFF"/>
+                </a:solidFill>
+              </a14:hiddenFill>
+            </a:ext>
+          </a:extLst>
+        </p:spPr>
+      </p:pic>
+      <p:pic>
+        <p:nvPicPr>
+          <p:cNvPr id="3086" name="Picture 14" descr="Image result for redis logo"/>
+          <p:cNvPicPr>
+            <a:picLocks noChangeAspect="1" noChangeArrowheads="1"/>
+          </p:cNvPicPr>
+          <p:nvPr/>
+        </p:nvPicPr>
+        <p:blipFill>
+          <a:blip r:embed="rId9" cstate="print">
+            <a:extLst>
+              <a:ext uri="{28A0092B-C50C-407E-A947-70E740481C1C}">
+                <a14:useLocalDpi xmlns:a14="http://schemas.microsoft.com/office/drawing/2010/main" val="0"/>
+              </a:ext>
+            </a:extLst>
+          </a:blip>
+          <a:srcRect/>
+          <a:stretch>
+            <a:fillRect/>
+          </a:stretch>
+        </p:blipFill>
+        <p:spPr bwMode="auto">
+          <a:xfrm>
+            <a:off x="3138643" y="5736981"/>
+            <a:ext cx="1647513" cy="550887"/>
+          </a:xfrm>
+          <a:prstGeom prst="rect">
+            <a:avLst/>
+          </a:prstGeom>
+          <a:noFill/>
+          <a:extLst>
+            <a:ext uri="{909E8E84-426E-40DD-AFC4-6F175D3DCCD1}">
+              <a14:hiddenFill xmlns:a14="http://schemas.microsoft.com/office/drawing/2010/main">
+                <a:solidFill>
+                  <a:srgbClr val="FFFFFF"/>
+                </a:solidFill>
+              </a14:hiddenFill>
+            </a:ext>
+          </a:extLst>
+        </p:spPr>
+      </p:pic>
+      <p:pic>
+        <p:nvPicPr>
+          <p:cNvPr id="3088" name="Picture 16" descr="Image result for bookshelf js"/>
+          <p:cNvPicPr>
+            <a:picLocks noChangeAspect="1" noChangeArrowheads="1"/>
+          </p:cNvPicPr>
+          <p:nvPr/>
+        </p:nvPicPr>
+        <p:blipFill>
+          <a:blip r:embed="rId10">
+            <a:extLst>
+              <a:ext uri="{28A0092B-C50C-407E-A947-70E740481C1C}">
+                <a14:useLocalDpi xmlns:a14="http://schemas.microsoft.com/office/drawing/2010/main" val="0"/>
+              </a:ext>
+            </a:extLst>
+          </a:blip>
+          <a:srcRect/>
+          <a:stretch>
+            <a:fillRect/>
+          </a:stretch>
+        </p:blipFill>
+        <p:spPr bwMode="auto">
+          <a:xfrm>
+            <a:off x="6553200" y="2362200"/>
+            <a:ext cx="2419476" cy="510779"/>
+          </a:xfrm>
+          <a:prstGeom prst="rect">
+            <a:avLst/>
+          </a:prstGeom>
+          <a:noFill/>
+          <a:extLst>
+            <a:ext uri="{909E8E84-426E-40DD-AFC4-6F175D3DCCD1}">
+              <a14:hiddenFill xmlns:a14="http://schemas.microsoft.com/office/drawing/2010/main">
+                <a:solidFill>
+                  <a:srgbClr val="FFFFFF"/>
+                </a:solidFill>
+              </a14:hiddenFill>
+            </a:ext>
+          </a:extLst>
+        </p:spPr>
+      </p:pic>
+      <p:pic>
+        <p:nvPicPr>
+          <p:cNvPr id="3090" name="Picture 18" descr="Image result for dynamodb"/>
+          <p:cNvPicPr>
+            <a:picLocks noChangeAspect="1" noChangeArrowheads="1"/>
+          </p:cNvPicPr>
+          <p:nvPr/>
+        </p:nvPicPr>
+        <p:blipFill>
+          <a:blip r:embed="rId11" cstate="print">
+            <a:extLst>
+              <a:ext uri="{28A0092B-C50C-407E-A947-70E740481C1C}">
+                <a14:useLocalDpi xmlns:a14="http://schemas.microsoft.com/office/drawing/2010/main" val="0"/>
+              </a:ext>
+            </a:extLst>
+          </a:blip>
+          <a:srcRect/>
+          <a:stretch>
+            <a:fillRect/>
+          </a:stretch>
+        </p:blipFill>
+        <p:spPr bwMode="auto">
+          <a:xfrm>
+            <a:off x="6172200" y="5702725"/>
+            <a:ext cx="1451043" cy="621875"/>
+          </a:xfrm>
+          <a:prstGeom prst="rect">
+            <a:avLst/>
+          </a:prstGeom>
+          <a:noFill/>
+          <a:extLst>
+            <a:ext uri="{909E8E84-426E-40DD-AFC4-6F175D3DCCD1}">
+              <a14:hiddenFill xmlns:a14="http://schemas.microsoft.com/office/drawing/2010/main">
+                <a:solidFill>
+                  <a:srgbClr val="FFFFFF"/>
+                </a:solidFill>
+              </a14:hiddenFill>
             </a:ext>
           </a:extLst>
         </p:spPr>
@@ -7643,7 +8165,7 @@
     </p:spTree>
     <p:extLst>
       <p:ext uri="{BB962C8B-B14F-4D97-AF65-F5344CB8AC3E}">
-        <p14:creationId xmlns:p14="http://schemas.microsoft.com/office/powerpoint/2010/main" val="742771758"/>
+        <p14:creationId xmlns:p14="http://schemas.microsoft.com/office/powerpoint/2010/main" val="1122745477"/>
       </p:ext>
     </p:extLst>
   </p:cSld>
@@ -7708,483 +8230,6 @@
                   <a:schemeClr val="bg1"/>
                 </a:solidFill>
               </a:rPr>
-              <a:t>Databases</a:t>
-            </a:r>
-            <a:endParaRPr lang="en-US" dirty="0">
-              <a:solidFill>
-                <a:schemeClr val="bg1"/>
-              </a:solidFill>
-            </a:endParaRPr>
-          </a:p>
-        </p:txBody>
-      </p:sp>
-      <p:pic>
-        <p:nvPicPr>
-          <p:cNvPr id="10" name="Picture 9"/>
-          <p:cNvPicPr>
-            <a:picLocks noChangeAspect="1"/>
-          </p:cNvPicPr>
-          <p:nvPr/>
-        </p:nvPicPr>
-        <p:blipFill>
-          <a:blip r:embed="rId2">
-            <a:extLst>
-              <a:ext uri="{28A0092B-C50C-407E-A947-70E740481C1C}">
-                <a14:useLocalDpi xmlns:a14="http://schemas.microsoft.com/office/drawing/2010/main" val="0"/>
-              </a:ext>
-            </a:extLst>
-          </a:blip>
-          <a:stretch>
-            <a:fillRect/>
-          </a:stretch>
-        </p:blipFill>
-        <p:spPr>
-          <a:xfrm>
-            <a:off x="7575188" y="6248400"/>
-            <a:ext cx="1461656" cy="609600"/>
-          </a:xfrm>
-          <a:prstGeom prst="rect">
-            <a:avLst/>
-          </a:prstGeom>
-        </p:spPr>
-      </p:pic>
-      <p:pic>
-        <p:nvPicPr>
-          <p:cNvPr id="3074" name="Picture 2" descr="Knex.js"/>
-          <p:cNvPicPr>
-            <a:picLocks noChangeAspect="1" noChangeArrowheads="1"/>
-          </p:cNvPicPr>
-          <p:nvPr/>
-        </p:nvPicPr>
-        <p:blipFill>
-          <a:blip r:embed="rId3">
-            <a:extLst>
-              <a:ext uri="{28A0092B-C50C-407E-A947-70E740481C1C}">
-                <a14:useLocalDpi xmlns:a14="http://schemas.microsoft.com/office/drawing/2010/main" val="0"/>
-              </a:ext>
-            </a:extLst>
-          </a:blip>
-          <a:srcRect/>
-          <a:stretch>
-            <a:fillRect/>
-          </a:stretch>
-        </p:blipFill>
-        <p:spPr bwMode="auto">
-          <a:xfrm>
-            <a:off x="1419104" y="2609851"/>
-            <a:ext cx="6181725" cy="2209801"/>
-          </a:xfrm>
-          <a:prstGeom prst="rect">
-            <a:avLst/>
-          </a:prstGeom>
-          <a:noFill/>
-          <a:extLst>
-            <a:ext uri="{909E8E84-426E-40DD-AFC4-6F175D3DCCD1}">
-              <a14:hiddenFill xmlns:a14="http://schemas.microsoft.com/office/drawing/2010/main">
-                <a:solidFill>
-                  <a:srgbClr val="FFFFFF"/>
-                </a:solidFill>
-              </a14:hiddenFill>
-            </a:ext>
-          </a:extLst>
-        </p:spPr>
-      </p:pic>
-      <p:pic>
-        <p:nvPicPr>
-          <p:cNvPr id="3076" name="Picture 4" descr="Image result for mongoose js"/>
-          <p:cNvPicPr>
-            <a:picLocks noChangeAspect="1" noChangeArrowheads="1"/>
-          </p:cNvPicPr>
-          <p:nvPr/>
-        </p:nvPicPr>
-        <p:blipFill>
-          <a:blip r:embed="rId4">
-            <a:extLst>
-              <a:ext uri="{28A0092B-C50C-407E-A947-70E740481C1C}">
-                <a14:useLocalDpi xmlns:a14="http://schemas.microsoft.com/office/drawing/2010/main" val="0"/>
-              </a:ext>
-            </a:extLst>
-          </a:blip>
-          <a:srcRect/>
-          <a:stretch>
-            <a:fillRect/>
-          </a:stretch>
-        </p:blipFill>
-        <p:spPr bwMode="auto">
-          <a:xfrm>
-            <a:off x="609600" y="1174780"/>
-            <a:ext cx="1973580" cy="1066800"/>
-          </a:xfrm>
-          <a:prstGeom prst="rect">
-            <a:avLst/>
-          </a:prstGeom>
-          <a:noFill/>
-          <a:extLst>
-            <a:ext uri="{909E8E84-426E-40DD-AFC4-6F175D3DCCD1}">
-              <a14:hiddenFill xmlns:a14="http://schemas.microsoft.com/office/drawing/2010/main">
-                <a:solidFill>
-                  <a:srgbClr val="FFFFFF"/>
-                </a:solidFill>
-              </a14:hiddenFill>
-            </a:ext>
-          </a:extLst>
-        </p:spPr>
-      </p:pic>
-      <p:pic>
-        <p:nvPicPr>
-          <p:cNvPr id="3078" name="Picture 6" descr="Image result for mongoose js"/>
-          <p:cNvPicPr>
-            <a:picLocks noChangeAspect="1" noChangeArrowheads="1"/>
-          </p:cNvPicPr>
-          <p:nvPr/>
-        </p:nvPicPr>
-        <p:blipFill>
-          <a:blip r:embed="rId5" cstate="print">
-            <a:extLst>
-              <a:ext uri="{28A0092B-C50C-407E-A947-70E740481C1C}">
-                <a14:useLocalDpi xmlns:a14="http://schemas.microsoft.com/office/drawing/2010/main" val="0"/>
-              </a:ext>
-            </a:extLst>
-          </a:blip>
-          <a:srcRect/>
-          <a:stretch>
-            <a:fillRect/>
-          </a:stretch>
-        </p:blipFill>
-        <p:spPr bwMode="auto">
-          <a:xfrm>
-            <a:off x="397856" y="5670490"/>
-            <a:ext cx="683868" cy="683868"/>
-          </a:xfrm>
-          <a:prstGeom prst="rect">
-            <a:avLst/>
-          </a:prstGeom>
-          <a:noFill/>
-          <a:extLst>
-            <a:ext uri="{909E8E84-426E-40DD-AFC4-6F175D3DCCD1}">
-              <a14:hiddenFill xmlns:a14="http://schemas.microsoft.com/office/drawing/2010/main">
-                <a:solidFill>
-                  <a:srgbClr val="FFFFFF"/>
-                </a:solidFill>
-              </a14:hiddenFill>
-            </a:ext>
-          </a:extLst>
-        </p:spPr>
-      </p:pic>
-      <p:pic>
-        <p:nvPicPr>
-          <p:cNvPr id="3080" name="Picture 8" descr="Image result for sequelize"/>
-          <p:cNvPicPr>
-            <a:picLocks noChangeAspect="1" noChangeArrowheads="1"/>
-          </p:cNvPicPr>
-          <p:nvPr/>
-        </p:nvPicPr>
-        <p:blipFill>
-          <a:blip r:embed="rId6">
-            <a:extLst>
-              <a:ext uri="{28A0092B-C50C-407E-A947-70E740481C1C}">
-                <a14:useLocalDpi xmlns:a14="http://schemas.microsoft.com/office/drawing/2010/main" val="0"/>
-              </a:ext>
-            </a:extLst>
-          </a:blip>
-          <a:srcRect/>
-          <a:stretch>
-            <a:fillRect/>
-          </a:stretch>
-        </p:blipFill>
-        <p:spPr bwMode="auto">
-          <a:xfrm>
-            <a:off x="4074319" y="1219200"/>
-            <a:ext cx="2819400" cy="1314451"/>
-          </a:xfrm>
-          <a:prstGeom prst="rect">
-            <a:avLst/>
-          </a:prstGeom>
-          <a:noFill/>
-          <a:extLst>
-            <a:ext uri="{909E8E84-426E-40DD-AFC4-6F175D3DCCD1}">
-              <a14:hiddenFill xmlns:a14="http://schemas.microsoft.com/office/drawing/2010/main">
-                <a:solidFill>
-                  <a:srgbClr val="FFFFFF"/>
-                </a:solidFill>
-              </a14:hiddenFill>
-            </a:ext>
-          </a:extLst>
-        </p:spPr>
-      </p:pic>
-      <p:pic>
-        <p:nvPicPr>
-          <p:cNvPr id="3082" name="Picture 10" descr="Image result for couchdb"/>
-          <p:cNvPicPr>
-            <a:picLocks noChangeAspect="1" noChangeArrowheads="1"/>
-          </p:cNvPicPr>
-          <p:nvPr/>
-        </p:nvPicPr>
-        <p:blipFill>
-          <a:blip r:embed="rId7">
-            <a:extLst>
-              <a:ext uri="{28A0092B-C50C-407E-A947-70E740481C1C}">
-                <a14:useLocalDpi xmlns:a14="http://schemas.microsoft.com/office/drawing/2010/main" val="0"/>
-              </a:ext>
-            </a:extLst>
-          </a:blip>
-          <a:srcRect/>
-          <a:stretch>
-            <a:fillRect/>
-          </a:stretch>
-        </p:blipFill>
-        <p:spPr bwMode="auto">
-          <a:xfrm>
-            <a:off x="5029200" y="5713797"/>
-            <a:ext cx="795917" cy="687003"/>
-          </a:xfrm>
-          <a:prstGeom prst="rect">
-            <a:avLst/>
-          </a:prstGeom>
-          <a:noFill/>
-          <a:extLst>
-            <a:ext uri="{909E8E84-426E-40DD-AFC4-6F175D3DCCD1}">
-              <a14:hiddenFill xmlns:a14="http://schemas.microsoft.com/office/drawing/2010/main">
-                <a:solidFill>
-                  <a:srgbClr val="FFFFFF"/>
-                </a:solidFill>
-              </a14:hiddenFill>
-            </a:ext>
-          </a:extLst>
-        </p:spPr>
-      </p:pic>
-      <p:pic>
-        <p:nvPicPr>
-          <p:cNvPr id="3084" name="Picture 12" descr="Image result for neo4j logo"/>
-          <p:cNvPicPr>
-            <a:picLocks noChangeAspect="1" noChangeArrowheads="1"/>
-          </p:cNvPicPr>
-          <p:nvPr/>
-        </p:nvPicPr>
-        <p:blipFill>
-          <a:blip r:embed="rId8" cstate="print">
-            <a:extLst>
-              <a:ext uri="{28A0092B-C50C-407E-A947-70E740481C1C}">
-                <a14:useLocalDpi xmlns:a14="http://schemas.microsoft.com/office/drawing/2010/main" val="0"/>
-              </a:ext>
-            </a:extLst>
-          </a:blip>
-          <a:srcRect/>
-          <a:stretch>
-            <a:fillRect/>
-          </a:stretch>
-        </p:blipFill>
-        <p:spPr bwMode="auto">
-          <a:xfrm>
-            <a:off x="1524000" y="5750399"/>
-            <a:ext cx="1343675" cy="537469"/>
-          </a:xfrm>
-          <a:prstGeom prst="rect">
-            <a:avLst/>
-          </a:prstGeom>
-          <a:noFill/>
-          <a:extLst>
-            <a:ext uri="{909E8E84-426E-40DD-AFC4-6F175D3DCCD1}">
-              <a14:hiddenFill xmlns:a14="http://schemas.microsoft.com/office/drawing/2010/main">
-                <a:solidFill>
-                  <a:srgbClr val="FFFFFF"/>
-                </a:solidFill>
-              </a14:hiddenFill>
-            </a:ext>
-          </a:extLst>
-        </p:spPr>
-      </p:pic>
-      <p:pic>
-        <p:nvPicPr>
-          <p:cNvPr id="3086" name="Picture 14" descr="Image result for redis logo"/>
-          <p:cNvPicPr>
-            <a:picLocks noChangeAspect="1" noChangeArrowheads="1"/>
-          </p:cNvPicPr>
-          <p:nvPr/>
-        </p:nvPicPr>
-        <p:blipFill>
-          <a:blip r:embed="rId9" cstate="print">
-            <a:extLst>
-              <a:ext uri="{28A0092B-C50C-407E-A947-70E740481C1C}">
-                <a14:useLocalDpi xmlns:a14="http://schemas.microsoft.com/office/drawing/2010/main" val="0"/>
-              </a:ext>
-            </a:extLst>
-          </a:blip>
-          <a:srcRect/>
-          <a:stretch>
-            <a:fillRect/>
-          </a:stretch>
-        </p:blipFill>
-        <p:spPr bwMode="auto">
-          <a:xfrm>
-            <a:off x="3138643" y="5736981"/>
-            <a:ext cx="1647513" cy="550887"/>
-          </a:xfrm>
-          <a:prstGeom prst="rect">
-            <a:avLst/>
-          </a:prstGeom>
-          <a:noFill/>
-          <a:extLst>
-            <a:ext uri="{909E8E84-426E-40DD-AFC4-6F175D3DCCD1}">
-              <a14:hiddenFill xmlns:a14="http://schemas.microsoft.com/office/drawing/2010/main">
-                <a:solidFill>
-                  <a:srgbClr val="FFFFFF"/>
-                </a:solidFill>
-              </a14:hiddenFill>
-            </a:ext>
-          </a:extLst>
-        </p:spPr>
-      </p:pic>
-      <p:pic>
-        <p:nvPicPr>
-          <p:cNvPr id="3088" name="Picture 16" descr="Image result for bookshelf js"/>
-          <p:cNvPicPr>
-            <a:picLocks noChangeAspect="1" noChangeArrowheads="1"/>
-          </p:cNvPicPr>
-          <p:nvPr/>
-        </p:nvPicPr>
-        <p:blipFill>
-          <a:blip r:embed="rId10">
-            <a:extLst>
-              <a:ext uri="{28A0092B-C50C-407E-A947-70E740481C1C}">
-                <a14:useLocalDpi xmlns:a14="http://schemas.microsoft.com/office/drawing/2010/main" val="0"/>
-              </a:ext>
-            </a:extLst>
-          </a:blip>
-          <a:srcRect/>
-          <a:stretch>
-            <a:fillRect/>
-          </a:stretch>
-        </p:blipFill>
-        <p:spPr bwMode="auto">
-          <a:xfrm>
-            <a:off x="6553200" y="2362200"/>
-            <a:ext cx="2419476" cy="510779"/>
-          </a:xfrm>
-          <a:prstGeom prst="rect">
-            <a:avLst/>
-          </a:prstGeom>
-          <a:noFill/>
-          <a:extLst>
-            <a:ext uri="{909E8E84-426E-40DD-AFC4-6F175D3DCCD1}">
-              <a14:hiddenFill xmlns:a14="http://schemas.microsoft.com/office/drawing/2010/main">
-                <a:solidFill>
-                  <a:srgbClr val="FFFFFF"/>
-                </a:solidFill>
-              </a14:hiddenFill>
-            </a:ext>
-          </a:extLst>
-        </p:spPr>
-      </p:pic>
-      <p:pic>
-        <p:nvPicPr>
-          <p:cNvPr id="3090" name="Picture 18" descr="Image result for dynamodb"/>
-          <p:cNvPicPr>
-            <a:picLocks noChangeAspect="1" noChangeArrowheads="1"/>
-          </p:cNvPicPr>
-          <p:nvPr/>
-        </p:nvPicPr>
-        <p:blipFill>
-          <a:blip r:embed="rId11" cstate="print">
-            <a:extLst>
-              <a:ext uri="{28A0092B-C50C-407E-A947-70E740481C1C}">
-                <a14:useLocalDpi xmlns:a14="http://schemas.microsoft.com/office/drawing/2010/main" val="0"/>
-              </a:ext>
-            </a:extLst>
-          </a:blip>
-          <a:srcRect/>
-          <a:stretch>
-            <a:fillRect/>
-          </a:stretch>
-        </p:blipFill>
-        <p:spPr bwMode="auto">
-          <a:xfrm>
-            <a:off x="6172200" y="5702725"/>
-            <a:ext cx="1451043" cy="621875"/>
-          </a:xfrm>
-          <a:prstGeom prst="rect">
-            <a:avLst/>
-          </a:prstGeom>
-          <a:noFill/>
-          <a:extLst>
-            <a:ext uri="{909E8E84-426E-40DD-AFC4-6F175D3DCCD1}">
-              <a14:hiddenFill xmlns:a14="http://schemas.microsoft.com/office/drawing/2010/main">
-                <a:solidFill>
-                  <a:srgbClr val="FFFFFF"/>
-                </a:solidFill>
-              </a14:hiddenFill>
-            </a:ext>
-          </a:extLst>
-        </p:spPr>
-      </p:pic>
-    </p:spTree>
-    <p:extLst>
-      <p:ext uri="{BB962C8B-B14F-4D97-AF65-F5344CB8AC3E}">
-        <p14:creationId xmlns:p14="http://schemas.microsoft.com/office/powerpoint/2010/main" val="1122745477"/>
-      </p:ext>
-    </p:extLst>
-  </p:cSld>
-  <p:clrMapOvr>
-    <a:masterClrMapping/>
-  </p:clrMapOvr>
-  <p:timing>
-    <p:tnLst>
-      <p:par>
-        <p:cTn id="1" dur="indefinite" restart="never" nodeType="tmRoot"/>
-      </p:par>
-    </p:tnLst>
-  </p:timing>
-</p:sld>
-</file>
-
-<file path=ppt/slides/slide28.xml><?xml version="1.0" encoding="utf-8"?>
-<p:sld xmlns:a="http://schemas.openxmlformats.org/drawingml/2006/main" xmlns:r="http://schemas.openxmlformats.org/officeDocument/2006/relationships" xmlns:p="http://schemas.openxmlformats.org/presentationml/2006/main">
-  <p:cSld>
-    <p:bg>
-      <p:bgPr>
-        <a:solidFill>
-          <a:srgbClr val="333333"/>
-        </a:solidFill>
-        <a:effectLst/>
-      </p:bgPr>
-    </p:bg>
-    <p:spTree>
-      <p:nvGrpSpPr>
-        <p:cNvPr id="1" name=""/>
-        <p:cNvGrpSpPr/>
-        <p:nvPr/>
-      </p:nvGrpSpPr>
-      <p:grpSpPr>
-        <a:xfrm>
-          <a:off x="0" y="0"/>
-          <a:ext cx="0" cy="0"/>
-          <a:chOff x="0" y="0"/>
-          <a:chExt cx="0" cy="0"/>
-        </a:xfrm>
-      </p:grpSpPr>
-      <p:sp>
-        <p:nvSpPr>
-          <p:cNvPr id="5" name="Title 4"/>
-          <p:cNvSpPr>
-            <a:spLocks noGrp="1"/>
-          </p:cNvSpPr>
-          <p:nvPr>
-            <p:ph type="title"/>
-          </p:nvPr>
-        </p:nvSpPr>
-        <p:spPr/>
-        <p:txBody>
-          <a:bodyPr>
-            <a:normAutofit/>
-          </a:bodyPr>
-          <a:lstStyle/>
-          <a:p>
-            <a:r>
-              <a:rPr lang="en-US" dirty="0" smtClean="0">
-                <a:solidFill>
-                  <a:schemeClr val="bg1"/>
-                </a:solidFill>
-              </a:rPr>
               <a:t>Example </a:t>
             </a:r>
             <a:r>
@@ -8315,7 +8360,7 @@
 </p:sld>
 </file>
 
-<file path=ppt/slides/slide29.xml><?xml version="1.0" encoding="utf-8"?>
+<file path=ppt/slides/slide28.xml><?xml version="1.0" encoding="utf-8"?>
 <p:sld xmlns:a="http://schemas.openxmlformats.org/drawingml/2006/main" xmlns:r="http://schemas.openxmlformats.org/officeDocument/2006/relationships" xmlns:p="http://schemas.openxmlformats.org/presentationml/2006/main">
   <p:cSld>
     <p:bg>
@@ -8505,6 +8550,213 @@
 </p:sld>
 </file>
 
+<file path=ppt/slides/slide29.xml><?xml version="1.0" encoding="utf-8"?>
+<p:sld xmlns:a="http://schemas.openxmlformats.org/drawingml/2006/main" xmlns:r="http://schemas.openxmlformats.org/officeDocument/2006/relationships" xmlns:p="http://schemas.openxmlformats.org/presentationml/2006/main">
+  <p:cSld>
+    <p:bg>
+      <p:bgPr>
+        <a:solidFill>
+          <a:srgbClr val="333333"/>
+        </a:solidFill>
+        <a:effectLst/>
+      </p:bgPr>
+    </p:bg>
+    <p:spTree>
+      <p:nvGrpSpPr>
+        <p:cNvPr id="1" name=""/>
+        <p:cNvGrpSpPr/>
+        <p:nvPr/>
+      </p:nvGrpSpPr>
+      <p:grpSpPr>
+        <a:xfrm>
+          <a:off x="0" y="0"/>
+          <a:ext cx="0" cy="0"/>
+          <a:chOff x="0" y="0"/>
+          <a:chExt cx="0" cy="0"/>
+        </a:xfrm>
+      </p:grpSpPr>
+      <p:sp>
+        <p:nvSpPr>
+          <p:cNvPr id="5" name="Title 4"/>
+          <p:cNvSpPr>
+            <a:spLocks noGrp="1"/>
+          </p:cNvSpPr>
+          <p:nvPr>
+            <p:ph type="ctrTitle"/>
+          </p:nvPr>
+        </p:nvSpPr>
+        <p:spPr>
+          <a:xfrm>
+            <a:off x="685800" y="457200"/>
+            <a:ext cx="7772400" cy="1470025"/>
+          </a:xfrm>
+        </p:spPr>
+        <p:txBody>
+          <a:bodyPr>
+            <a:normAutofit/>
+          </a:bodyPr>
+          <a:lstStyle/>
+          <a:p>
+            <a:r>
+              <a:rPr lang="en-US" dirty="0" smtClean="0">
+                <a:solidFill>
+                  <a:schemeClr val="bg1"/>
+                </a:solidFill>
+              </a:rPr>
+              <a:t>Now we build</a:t>
+            </a:r>
+            <a:endParaRPr lang="en-US" dirty="0">
+              <a:solidFill>
+                <a:schemeClr val="bg1"/>
+              </a:solidFill>
+            </a:endParaRPr>
+          </a:p>
+        </p:txBody>
+      </p:sp>
+      <p:sp>
+        <p:nvSpPr>
+          <p:cNvPr id="3" name="Content Placeholder 2"/>
+          <p:cNvSpPr>
+            <a:spLocks noGrp="1"/>
+          </p:cNvSpPr>
+          <p:nvPr>
+            <p:ph type="subTitle" idx="1"/>
+          </p:nvPr>
+        </p:nvSpPr>
+        <p:spPr>
+          <a:xfrm>
+            <a:off x="1371600" y="2895600"/>
+            <a:ext cx="6400800" cy="1752600"/>
+          </a:xfrm>
+        </p:spPr>
+        <p:txBody>
+          <a:bodyPr/>
+          <a:lstStyle/>
+          <a:p>
+            <a:r>
+              <a:rPr lang="en-US" dirty="0" smtClean="0">
+                <a:solidFill>
+                  <a:schemeClr val="bg1"/>
+                </a:solidFill>
+              </a:rPr>
+              <a:t>…a crappy twitter clone</a:t>
+            </a:r>
+            <a:endParaRPr lang="en-US" dirty="0">
+              <a:solidFill>
+                <a:schemeClr val="bg1"/>
+              </a:solidFill>
+            </a:endParaRPr>
+          </a:p>
+        </p:txBody>
+      </p:sp>
+      <p:pic>
+        <p:nvPicPr>
+          <p:cNvPr id="10" name="Picture 9"/>
+          <p:cNvPicPr>
+            <a:picLocks noChangeAspect="1"/>
+          </p:cNvPicPr>
+          <p:nvPr/>
+        </p:nvPicPr>
+        <p:blipFill>
+          <a:blip r:embed="rId3">
+            <a:extLst>
+              <a:ext uri="{28A0092B-C50C-407E-A947-70E740481C1C}">
+                <a14:useLocalDpi xmlns:a14="http://schemas.microsoft.com/office/drawing/2010/main" val="0"/>
+              </a:ext>
+            </a:extLst>
+          </a:blip>
+          <a:stretch>
+            <a:fillRect/>
+          </a:stretch>
+        </p:blipFill>
+        <p:spPr>
+          <a:xfrm>
+            <a:off x="7575188" y="6248400"/>
+            <a:ext cx="1461656" cy="609600"/>
+          </a:xfrm>
+          <a:prstGeom prst="rect">
+            <a:avLst/>
+          </a:prstGeom>
+        </p:spPr>
+      </p:pic>
+      <p:sp>
+        <p:nvSpPr>
+          <p:cNvPr id="2" name="TextBox 1"/>
+          <p:cNvSpPr txBox="1"/>
+          <p:nvPr/>
+        </p:nvSpPr>
+        <p:spPr>
+          <a:xfrm>
+            <a:off x="3200400" y="5029200"/>
+            <a:ext cx="2726067" cy="923330"/>
+          </a:xfrm>
+          <a:prstGeom prst="rect">
+            <a:avLst/>
+          </a:prstGeom>
+          <a:noFill/>
+        </p:spPr>
+        <p:txBody>
+          <a:bodyPr wrap="none" rtlCol="0">
+            <a:spAutoFit/>
+          </a:bodyPr>
+          <a:lstStyle/>
+          <a:p>
+            <a:pPr algn="ctr"/>
+            <a:r>
+              <a:rPr lang="en-US" i="1" dirty="0" smtClean="0">
+                <a:solidFill>
+                  <a:schemeClr val="bg1"/>
+                </a:solidFill>
+              </a:rPr>
+              <a:t>Warning: live coding ahead</a:t>
+            </a:r>
+          </a:p>
+          <a:p>
+            <a:pPr algn="ctr"/>
+            <a:endParaRPr lang="en-US" i="1" dirty="0">
+              <a:solidFill>
+                <a:schemeClr val="bg1"/>
+              </a:solidFill>
+            </a:endParaRPr>
+          </a:p>
+          <a:p>
+            <a:pPr algn="ctr"/>
+            <a:r>
+              <a:rPr lang="en-US" i="1" dirty="0" smtClean="0">
+                <a:solidFill>
+                  <a:schemeClr val="bg1"/>
+                </a:solidFill>
+              </a:rPr>
+              <a:t>Stuff WILL go wrong</a:t>
+            </a:r>
+            <a:endParaRPr lang="en-US" i="1" dirty="0">
+              <a:solidFill>
+                <a:schemeClr val="bg1"/>
+              </a:solidFill>
+            </a:endParaRPr>
+          </a:p>
+        </p:txBody>
+      </p:sp>
+    </p:spTree>
+    <p:extLst>
+      <p:ext uri="{BB962C8B-B14F-4D97-AF65-F5344CB8AC3E}">
+        <p14:creationId xmlns:p14="http://schemas.microsoft.com/office/powerpoint/2010/main" val="1268718335"/>
+      </p:ext>
+    </p:extLst>
+  </p:cSld>
+  <p:clrMapOvr>
+    <a:masterClrMapping/>
+  </p:clrMapOvr>
+  <p:timing>
+    <p:tnLst>
+      <p:par>
+        <p:cTn id="1" dur="indefinite" restart="never" nodeType="tmRoot"/>
+      </p:par>
+    </p:tnLst>
+  </p:timing>
+</p:sld>
+</file>
+
 <file path=ppt/slides/slide3.xml><?xml version="1.0" encoding="utf-8"?>
 <p:sld xmlns:a="http://schemas.openxmlformats.org/drawingml/2006/main" xmlns:r="http://schemas.openxmlformats.org/officeDocument/2006/relationships" xmlns:p="http://schemas.openxmlformats.org/presentationml/2006/main">
   <p:cSld>
@@ -8958,7 +9210,7 @@
       </p:grpSpPr>
       <p:sp>
         <p:nvSpPr>
-          <p:cNvPr id="5" name="Title 4"/>
+          <p:cNvPr id="2" name="Title 1"/>
           <p:cNvSpPr>
             <a:spLocks noGrp="1"/>
           </p:cNvSpPr>
@@ -8966,50 +9218,7 @@
             <p:ph type="ctrTitle"/>
           </p:nvPr>
         </p:nvSpPr>
-        <p:spPr>
-          <a:xfrm>
-            <a:off x="685800" y="457200"/>
-            <a:ext cx="7772400" cy="1470025"/>
-          </a:xfrm>
-        </p:spPr>
-        <p:txBody>
-          <a:bodyPr>
-            <a:normAutofit/>
-          </a:bodyPr>
-          <a:lstStyle/>
-          <a:p>
-            <a:r>
-              <a:rPr lang="en-US" dirty="0" smtClean="0">
-                <a:solidFill>
-                  <a:schemeClr val="bg1"/>
-                </a:solidFill>
-              </a:rPr>
-              <a:t>Now we build</a:t>
-            </a:r>
-            <a:endParaRPr lang="en-US" dirty="0">
-              <a:solidFill>
-                <a:schemeClr val="bg1"/>
-              </a:solidFill>
-            </a:endParaRPr>
-          </a:p>
-        </p:txBody>
-      </p:sp>
-      <p:sp>
-        <p:nvSpPr>
-          <p:cNvPr id="3" name="Content Placeholder 2"/>
-          <p:cNvSpPr>
-            <a:spLocks noGrp="1"/>
-          </p:cNvSpPr>
-          <p:nvPr>
-            <p:ph type="subTitle" idx="1"/>
-          </p:nvPr>
-        </p:nvSpPr>
-        <p:spPr>
-          <a:xfrm>
-            <a:off x="1371600" y="2895600"/>
-            <a:ext cx="6400800" cy="1752600"/>
-          </a:xfrm>
-        </p:spPr>
+        <p:spPr/>
         <p:txBody>
           <a:bodyPr/>
           <a:lstStyle/>
@@ -9020,204 +9229,7 @@
                   <a:schemeClr val="bg1"/>
                 </a:solidFill>
               </a:rPr>
-              <a:t>…a crappy twitter clone</a:t>
-            </a:r>
-            <a:endParaRPr lang="en-US" dirty="0">
-              <a:solidFill>
-                <a:schemeClr val="bg1"/>
-              </a:solidFill>
-            </a:endParaRPr>
-          </a:p>
-        </p:txBody>
-      </p:sp>
-      <p:pic>
-        <p:nvPicPr>
-          <p:cNvPr id="10" name="Picture 9"/>
-          <p:cNvPicPr>
-            <a:picLocks noChangeAspect="1"/>
-          </p:cNvPicPr>
-          <p:nvPr/>
-        </p:nvPicPr>
-        <p:blipFill>
-          <a:blip r:embed="rId3">
-            <a:extLst>
-              <a:ext uri="{28A0092B-C50C-407E-A947-70E740481C1C}">
-                <a14:useLocalDpi xmlns:a14="http://schemas.microsoft.com/office/drawing/2010/main" val="0"/>
-              </a:ext>
-            </a:extLst>
-          </a:blip>
-          <a:stretch>
-            <a:fillRect/>
-          </a:stretch>
-        </p:blipFill>
-        <p:spPr>
-          <a:xfrm>
-            <a:off x="7575188" y="6248400"/>
-            <a:ext cx="1461656" cy="609600"/>
-          </a:xfrm>
-          <a:prstGeom prst="rect">
-            <a:avLst/>
-          </a:prstGeom>
-        </p:spPr>
-      </p:pic>
-      <p:sp>
-        <p:nvSpPr>
-          <p:cNvPr id="2" name="TextBox 1"/>
-          <p:cNvSpPr txBox="1"/>
-          <p:nvPr/>
-        </p:nvSpPr>
-        <p:spPr>
-          <a:xfrm>
-            <a:off x="3200400" y="5029200"/>
-            <a:ext cx="2726067" cy="923330"/>
-          </a:xfrm>
-          <a:prstGeom prst="rect">
-            <a:avLst/>
-          </a:prstGeom>
-          <a:noFill/>
-        </p:spPr>
-        <p:txBody>
-          <a:bodyPr wrap="none" rtlCol="0">
-            <a:spAutoFit/>
-          </a:bodyPr>
-          <a:lstStyle/>
-          <a:p>
-            <a:pPr algn="ctr"/>
-            <a:r>
-              <a:rPr lang="en-US" i="1" dirty="0" smtClean="0">
-                <a:solidFill>
-                  <a:schemeClr val="bg1"/>
-                </a:solidFill>
-              </a:rPr>
-              <a:t>Warning: live coding ahead</a:t>
-            </a:r>
-          </a:p>
-          <a:p>
-            <a:pPr algn="ctr"/>
-            <a:endParaRPr lang="en-US" i="1" dirty="0">
-              <a:solidFill>
-                <a:schemeClr val="bg1"/>
-              </a:solidFill>
-            </a:endParaRPr>
-          </a:p>
-          <a:p>
-            <a:pPr algn="ctr"/>
-            <a:r>
-              <a:rPr lang="en-US" i="1" dirty="0" smtClean="0">
-                <a:solidFill>
-                  <a:schemeClr val="bg1"/>
-                </a:solidFill>
-              </a:rPr>
-              <a:t>Stuff WILL go wrong</a:t>
-            </a:r>
-            <a:endParaRPr lang="en-US" i="1" dirty="0">
-              <a:solidFill>
-                <a:schemeClr val="bg1"/>
-              </a:solidFill>
-            </a:endParaRPr>
-          </a:p>
-        </p:txBody>
-      </p:sp>
-    </p:spTree>
-    <p:extLst>
-      <p:ext uri="{BB962C8B-B14F-4D97-AF65-F5344CB8AC3E}">
-        <p14:creationId xmlns:p14="http://schemas.microsoft.com/office/powerpoint/2010/main" val="1268718335"/>
-      </p:ext>
-    </p:extLst>
-  </p:cSld>
-  <p:clrMapOvr>
-    <a:masterClrMapping/>
-  </p:clrMapOvr>
-  <p:timing>
-    <p:tnLst>
-      <p:par>
-        <p:cTn id="1" dur="indefinite" restart="never" nodeType="tmRoot"/>
-      </p:par>
-    </p:tnLst>
-  </p:timing>
-</p:sld>
-</file>
-
-<file path=ppt/slides/slide31.xml><?xml version="1.0" encoding="utf-8"?>
-<p:sld xmlns:a="http://schemas.openxmlformats.org/drawingml/2006/main" xmlns:r="http://schemas.openxmlformats.org/officeDocument/2006/relationships" xmlns:p="http://schemas.openxmlformats.org/presentationml/2006/main">
-  <p:cSld>
-    <p:bg>
-      <p:bgPr>
-        <a:solidFill>
-          <a:srgbClr val="333333"/>
-        </a:solidFill>
-        <a:effectLst/>
-      </p:bgPr>
-    </p:bg>
-    <p:spTree>
-      <p:nvGrpSpPr>
-        <p:cNvPr id="1" name=""/>
-        <p:cNvGrpSpPr/>
-        <p:nvPr/>
-      </p:nvGrpSpPr>
-      <p:grpSpPr>
-        <a:xfrm>
-          <a:off x="0" y="0"/>
-          <a:ext cx="0" cy="0"/>
-          <a:chOff x="0" y="0"/>
-          <a:chExt cx="0" cy="0"/>
-        </a:xfrm>
-      </p:grpSpPr>
-      <p:sp>
-        <p:nvSpPr>
-          <p:cNvPr id="5" name="Title 4"/>
-          <p:cNvSpPr>
-            <a:spLocks noGrp="1"/>
-          </p:cNvSpPr>
-          <p:nvPr>
-            <p:ph type="title"/>
-          </p:nvPr>
-        </p:nvSpPr>
-        <p:spPr/>
-        <p:txBody>
-          <a:bodyPr>
-            <a:normAutofit/>
-          </a:bodyPr>
-          <a:lstStyle/>
-          <a:p>
-            <a:r>
-              <a:rPr lang="en-US" dirty="0" smtClean="0">
-                <a:solidFill>
-                  <a:schemeClr val="bg1"/>
-                </a:solidFill>
-              </a:rPr>
-              <a:t>Title</a:t>
-            </a:r>
-            <a:endParaRPr lang="en-US" dirty="0">
-              <a:solidFill>
-                <a:schemeClr val="bg1"/>
-              </a:solidFill>
-            </a:endParaRPr>
-          </a:p>
-        </p:txBody>
-      </p:sp>
-      <p:sp>
-        <p:nvSpPr>
-          <p:cNvPr id="3" name="Content Placeholder 2"/>
-          <p:cNvSpPr>
-            <a:spLocks noGrp="1"/>
-          </p:cNvSpPr>
-          <p:nvPr>
-            <p:ph idx="1"/>
-          </p:nvPr>
-        </p:nvSpPr>
-        <p:spPr/>
-        <p:txBody>
-          <a:bodyPr/>
-          <a:lstStyle/>
-          <a:p>
-            <a:r>
-              <a:rPr lang="en-US" dirty="0" smtClean="0">
-                <a:solidFill>
-                  <a:schemeClr val="bg1"/>
-                </a:solidFill>
-              </a:rPr>
-              <a:t>Content</a:t>
+              <a:t>Questions?</a:t>
             </a:r>
             <a:endParaRPr lang="en-US" dirty="0">
               <a:solidFill>
@@ -9257,112 +9269,6 @@
           </a:prstGeom>
         </p:spPr>
       </p:pic>
-    </p:spTree>
-    <p:extLst>
-      <p:ext uri="{BB962C8B-B14F-4D97-AF65-F5344CB8AC3E}">
-        <p14:creationId xmlns:p14="http://schemas.microsoft.com/office/powerpoint/2010/main" val="3505371779"/>
-      </p:ext>
-    </p:extLst>
-  </p:cSld>
-  <p:clrMapOvr>
-    <a:masterClrMapping/>
-  </p:clrMapOvr>
-  <p:timing>
-    <p:tnLst>
-      <p:par>
-        <p:cTn id="1" dur="indefinite" restart="never" nodeType="tmRoot"/>
-      </p:par>
-    </p:tnLst>
-  </p:timing>
-</p:sld>
-</file>
-
-<file path=ppt/slides/slide32.xml><?xml version="1.0" encoding="utf-8"?>
-<p:sld xmlns:a="http://schemas.openxmlformats.org/drawingml/2006/main" xmlns:r="http://schemas.openxmlformats.org/officeDocument/2006/relationships" xmlns:p="http://schemas.openxmlformats.org/presentationml/2006/main">
-  <p:cSld>
-    <p:bg>
-      <p:bgPr>
-        <a:solidFill>
-          <a:srgbClr val="333333"/>
-        </a:solidFill>
-        <a:effectLst/>
-      </p:bgPr>
-    </p:bg>
-    <p:spTree>
-      <p:nvGrpSpPr>
-        <p:cNvPr id="1" name=""/>
-        <p:cNvGrpSpPr/>
-        <p:nvPr/>
-      </p:nvGrpSpPr>
-      <p:grpSpPr>
-        <a:xfrm>
-          <a:off x="0" y="0"/>
-          <a:ext cx="0" cy="0"/>
-          <a:chOff x="0" y="0"/>
-          <a:chExt cx="0" cy="0"/>
-        </a:xfrm>
-      </p:grpSpPr>
-      <p:sp>
-        <p:nvSpPr>
-          <p:cNvPr id="2" name="Title 1"/>
-          <p:cNvSpPr>
-            <a:spLocks noGrp="1"/>
-          </p:cNvSpPr>
-          <p:nvPr>
-            <p:ph type="ctrTitle"/>
-          </p:nvPr>
-        </p:nvSpPr>
-        <p:spPr/>
-        <p:txBody>
-          <a:bodyPr/>
-          <a:lstStyle/>
-          <a:p>
-            <a:r>
-              <a:rPr lang="en-US" dirty="0" smtClean="0">
-                <a:solidFill>
-                  <a:schemeClr val="bg1"/>
-                </a:solidFill>
-              </a:rPr>
-              <a:t>Questions?</a:t>
-            </a:r>
-            <a:endParaRPr lang="en-US" dirty="0">
-              <a:solidFill>
-                <a:schemeClr val="bg1"/>
-              </a:solidFill>
-            </a:endParaRPr>
-          </a:p>
-        </p:txBody>
-      </p:sp>
-      <p:pic>
-        <p:nvPicPr>
-          <p:cNvPr id="10" name="Picture 9"/>
-          <p:cNvPicPr>
-            <a:picLocks noChangeAspect="1"/>
-          </p:cNvPicPr>
-          <p:nvPr/>
-        </p:nvPicPr>
-        <p:blipFill>
-          <a:blip r:embed="rId2">
-            <a:extLst>
-              <a:ext uri="{28A0092B-C50C-407E-A947-70E740481C1C}">
-                <a14:useLocalDpi xmlns:a14="http://schemas.microsoft.com/office/drawing/2010/main" val="0"/>
-              </a:ext>
-            </a:extLst>
-          </a:blip>
-          <a:stretch>
-            <a:fillRect/>
-          </a:stretch>
-        </p:blipFill>
-        <p:spPr>
-          <a:xfrm>
-            <a:off x="7575188" y="6248400"/>
-            <a:ext cx="1461656" cy="609600"/>
-          </a:xfrm>
-          <a:prstGeom prst="rect">
-            <a:avLst/>
-          </a:prstGeom>
-        </p:spPr>
-      </p:pic>
       <p:sp>
         <p:nvSpPr>
           <p:cNvPr id="4" name="Subtitle 3"/>
@@ -9373,7 +9279,12 @@
             <p:ph type="subTitle" idx="1"/>
           </p:nvPr>
         </p:nvSpPr>
-        <p:spPr/>
+        <p:spPr>
+          <a:xfrm>
+            <a:off x="1371600" y="3886200"/>
+            <a:ext cx="6400800" cy="2286000"/>
+          </a:xfrm>
+        </p:spPr>
         <p:txBody>
           <a:bodyPr>
             <a:normAutofit lnSpcReduction="10000"/>
@@ -9386,15 +9297,7 @@
                   <a:schemeClr val="bg1"/>
                 </a:solidFill>
               </a:rPr>
-              <a:t>Everything we did can be found </a:t>
-            </a:r>
-            <a:r>
-              <a:rPr lang="en-US" dirty="0" smtClean="0">
-                <a:solidFill>
-                  <a:schemeClr val="bg1"/>
-                </a:solidFill>
-              </a:rPr>
-              <a:t>at</a:t>
+              <a:t>Everything we did can be found at</a:t>
             </a:r>
           </a:p>
           <a:p>
@@ -9406,14 +9309,111 @@
           </a:p>
           <a:p>
             <a:r>
+              <a:rPr lang="en-US" sz="1800" dirty="0" smtClean="0">
+                <a:solidFill>
+                  <a:schemeClr val="bg1"/>
+                </a:solidFill>
+              </a:rPr>
+              <a:t>github.com/</a:t>
+            </a:r>
+            <a:r>
+              <a:rPr lang="en-US" sz="1800" dirty="0" err="1" smtClean="0">
+                <a:solidFill>
+                  <a:schemeClr val="bg1"/>
+                </a:solidFill>
+              </a:rPr>
+              <a:t>hlfshell</a:t>
+            </a:r>
+            <a:r>
+              <a:rPr lang="en-US" sz="1800" dirty="0" smtClean="0">
+                <a:solidFill>
+                  <a:schemeClr val="bg1"/>
+                </a:solidFill>
+              </a:rPr>
+              <a:t>/</a:t>
+            </a:r>
+            <a:r>
+              <a:rPr lang="en-US" sz="1800" dirty="0" err="1" smtClean="0">
+                <a:solidFill>
+                  <a:schemeClr val="bg1"/>
+                </a:solidFill>
+              </a:rPr>
+              <a:t>node.jSTL</a:t>
+            </a:r>
+            <a:r>
+              <a:rPr lang="en-US" sz="1800" dirty="0" smtClean="0">
+                <a:solidFill>
+                  <a:schemeClr val="bg1"/>
+                </a:solidFill>
+              </a:rPr>
+              <a:t>-Intro-Series-</a:t>
+            </a:r>
+            <a:r>
               <a:rPr lang="en-US" sz="1800" dirty="0">
                 <a:solidFill>
                   <a:schemeClr val="bg1"/>
                 </a:solidFill>
               </a:rPr>
-              <a:t>https://github.com/hlfshell/node.jSTL-Intro-Series---An-Introduction-to-Express</a:t>
-            </a:r>
-            <a:endParaRPr lang="en-US" dirty="0">
+              <a:t>--</a:t>
+            </a:r>
+            <a:r>
+              <a:rPr lang="en-US" sz="1800" dirty="0" smtClean="0">
+                <a:solidFill>
+                  <a:schemeClr val="bg1"/>
+                </a:solidFill>
+              </a:rPr>
+              <a:t>An-Introduction-to-Express</a:t>
+            </a:r>
+          </a:p>
+          <a:p>
+            <a:endParaRPr lang="en-US" sz="1800" dirty="0" smtClean="0">
+              <a:solidFill>
+                <a:schemeClr val="bg1"/>
+              </a:solidFill>
+            </a:endParaRPr>
+          </a:p>
+          <a:p>
+            <a:r>
+              <a:rPr lang="en-US" sz="1800" dirty="0" smtClean="0">
+                <a:solidFill>
+                  <a:schemeClr val="bg1"/>
+                </a:solidFill>
+              </a:rPr>
+              <a:t>Look for </a:t>
+            </a:r>
+            <a:r>
+              <a:rPr lang="en-US" sz="1800" dirty="0" err="1" smtClean="0">
+                <a:solidFill>
+                  <a:schemeClr val="bg1"/>
+                </a:solidFill>
+              </a:rPr>
+              <a:t>node.jSTL</a:t>
+            </a:r>
+            <a:r>
+              <a:rPr lang="en-US" sz="1800" dirty="0" smtClean="0">
+                <a:solidFill>
+                  <a:schemeClr val="bg1"/>
+                </a:solidFill>
+              </a:rPr>
+              <a:t> on </a:t>
+            </a:r>
+            <a:r>
+              <a:rPr lang="en-US" sz="1800" dirty="0" err="1" smtClean="0">
+                <a:solidFill>
+                  <a:schemeClr val="bg1"/>
+                </a:solidFill>
+              </a:rPr>
+              <a:t>Youtube</a:t>
+            </a:r>
+            <a:r>
+              <a:rPr lang="en-US" sz="1800" dirty="0" smtClean="0">
+                <a:solidFill>
+                  <a:schemeClr val="bg1"/>
+                </a:solidFill>
+              </a:rPr>
+              <a:t>!</a:t>
+            </a:r>
+            <a:endParaRPr lang="en-US" sz="1800" dirty="0">
               <a:solidFill>
                 <a:schemeClr val="bg1"/>
               </a:solidFill>

</xml_diff>

<commit_message>
fix: Some slight fixes/adjustments on the middleware section, resizing some images
</commit_message>
<xml_diff>
--- a/nodejs intro to express.pptx
+++ b/nodejs intro to express.pptx
@@ -221,7 +221,7 @@
           <a:p>
             <a:fld id="{E843B134-FC3F-4215-BD54-639A1EEA8DA6}" type="datetimeFigureOut">
               <a:rPr lang="en-US" smtClean="0"/>
-              <a:t>2/27/2017</a:t>
+              <a:t>3/1/2017</a:t>
             </a:fld>
             <a:endParaRPr lang="en-US"/>
           </a:p>
@@ -754,7 +754,7 @@
           <a:p>
             <a:fld id="{75A3C5B4-6199-4031-B143-8199622DDC1A}" type="datetimeFigureOut">
               <a:rPr lang="en-US" smtClean="0"/>
-              <a:t>2/27/2017</a:t>
+              <a:t>3/1/2017</a:t>
             </a:fld>
             <a:endParaRPr lang="en-US"/>
           </a:p>
@@ -924,7 +924,7 @@
           <a:p>
             <a:fld id="{75A3C5B4-6199-4031-B143-8199622DDC1A}" type="datetimeFigureOut">
               <a:rPr lang="en-US" smtClean="0"/>
-              <a:t>2/27/2017</a:t>
+              <a:t>3/1/2017</a:t>
             </a:fld>
             <a:endParaRPr lang="en-US"/>
           </a:p>
@@ -1104,7 +1104,7 @@
           <a:p>
             <a:fld id="{75A3C5B4-6199-4031-B143-8199622DDC1A}" type="datetimeFigureOut">
               <a:rPr lang="en-US" smtClean="0"/>
-              <a:t>2/27/2017</a:t>
+              <a:t>3/1/2017</a:t>
             </a:fld>
             <a:endParaRPr lang="en-US"/>
           </a:p>
@@ -1274,7 +1274,7 @@
           <a:p>
             <a:fld id="{75A3C5B4-6199-4031-B143-8199622DDC1A}" type="datetimeFigureOut">
               <a:rPr lang="en-US" smtClean="0"/>
-              <a:t>2/27/2017</a:t>
+              <a:t>3/1/2017</a:t>
             </a:fld>
             <a:endParaRPr lang="en-US"/>
           </a:p>
@@ -1520,7 +1520,7 @@
           <a:p>
             <a:fld id="{75A3C5B4-6199-4031-B143-8199622DDC1A}" type="datetimeFigureOut">
               <a:rPr lang="en-US" smtClean="0"/>
-              <a:t>2/27/2017</a:t>
+              <a:t>3/1/2017</a:t>
             </a:fld>
             <a:endParaRPr lang="en-US"/>
           </a:p>
@@ -1808,7 +1808,7 @@
           <a:p>
             <a:fld id="{75A3C5B4-6199-4031-B143-8199622DDC1A}" type="datetimeFigureOut">
               <a:rPr lang="en-US" smtClean="0"/>
-              <a:t>2/27/2017</a:t>
+              <a:t>3/1/2017</a:t>
             </a:fld>
             <a:endParaRPr lang="en-US"/>
           </a:p>
@@ -2230,7 +2230,7 @@
           <a:p>
             <a:fld id="{75A3C5B4-6199-4031-B143-8199622DDC1A}" type="datetimeFigureOut">
               <a:rPr lang="en-US" smtClean="0"/>
-              <a:t>2/27/2017</a:t>
+              <a:t>3/1/2017</a:t>
             </a:fld>
             <a:endParaRPr lang="en-US"/>
           </a:p>
@@ -2348,7 +2348,7 @@
           <a:p>
             <a:fld id="{75A3C5B4-6199-4031-B143-8199622DDC1A}" type="datetimeFigureOut">
               <a:rPr lang="en-US" smtClean="0"/>
-              <a:t>2/27/2017</a:t>
+              <a:t>3/1/2017</a:t>
             </a:fld>
             <a:endParaRPr lang="en-US"/>
           </a:p>
@@ -2443,7 +2443,7 @@
           <a:p>
             <a:fld id="{75A3C5B4-6199-4031-B143-8199622DDC1A}" type="datetimeFigureOut">
               <a:rPr lang="en-US" smtClean="0"/>
-              <a:t>2/27/2017</a:t>
+              <a:t>3/1/2017</a:t>
             </a:fld>
             <a:endParaRPr lang="en-US"/>
           </a:p>
@@ -2720,7 +2720,7 @@
           <a:p>
             <a:fld id="{75A3C5B4-6199-4031-B143-8199622DDC1A}" type="datetimeFigureOut">
               <a:rPr lang="en-US" smtClean="0"/>
-              <a:t>2/27/2017</a:t>
+              <a:t>3/1/2017</a:t>
             </a:fld>
             <a:endParaRPr lang="en-US"/>
           </a:p>
@@ -2973,7 +2973,7 @@
           <a:p>
             <a:fld id="{75A3C5B4-6199-4031-B143-8199622DDC1A}" type="datetimeFigureOut">
               <a:rPr lang="en-US" smtClean="0"/>
-              <a:t>2/27/2017</a:t>
+              <a:t>3/1/2017</a:t>
             </a:fld>
             <a:endParaRPr lang="en-US"/>
           </a:p>
@@ -3186,7 +3186,7 @@
           <a:p>
             <a:fld id="{75A3C5B4-6199-4031-B143-8199622DDC1A}" type="datetimeFigureOut">
               <a:rPr lang="en-US" smtClean="0"/>
-              <a:t>2/27/2017</a:t>
+              <a:t>3/1/2017</a:t>
             </a:fld>
             <a:endParaRPr lang="en-US"/>
           </a:p>
@@ -6501,7 +6501,7 @@
       </p:pic>
       <p:pic>
         <p:nvPicPr>
-          <p:cNvPr id="1026" name="Picture 2"/>
+          <p:cNvPr id="2050" name="Picture 2"/>
           <p:cNvPicPr>
             <a:picLocks noChangeAspect="1" noChangeArrowheads="1"/>
           </p:cNvPicPr>
@@ -6522,8 +6522,8 @@
         </p:blipFill>
         <p:spPr bwMode="auto">
           <a:xfrm>
-            <a:off x="123369" y="1423273"/>
-            <a:ext cx="8897263" cy="3758327"/>
+            <a:off x="137314" y="1504514"/>
+            <a:ext cx="8869372" cy="3848973"/>
           </a:xfrm>
           <a:prstGeom prst="rect">
             <a:avLst/>
@@ -7578,7 +7578,12 @@
             <p:ph type="title"/>
           </p:nvPr>
         </p:nvSpPr>
-        <p:spPr/>
+        <p:spPr>
+          <a:xfrm>
+            <a:off x="457200" y="-228600"/>
+            <a:ext cx="8229600" cy="1143000"/>
+          </a:xfrm>
+        </p:spPr>
         <p:txBody>
           <a:bodyPr>
             <a:normAutofit/>
@@ -7601,36 +7606,6 @@
           </a:p>
         </p:txBody>
       </p:sp>
-      <p:pic>
-        <p:nvPicPr>
-          <p:cNvPr id="10" name="Picture 9"/>
-          <p:cNvPicPr>
-            <a:picLocks noChangeAspect="1"/>
-          </p:cNvPicPr>
-          <p:nvPr/>
-        </p:nvPicPr>
-        <p:blipFill>
-          <a:blip r:embed="rId2">
-            <a:extLst>
-              <a:ext uri="{28A0092B-C50C-407E-A947-70E740481C1C}">
-                <a14:useLocalDpi xmlns:a14="http://schemas.microsoft.com/office/drawing/2010/main" val="0"/>
-              </a:ext>
-            </a:extLst>
-          </a:blip>
-          <a:stretch>
-            <a:fillRect/>
-          </a:stretch>
-        </p:blipFill>
-        <p:spPr>
-          <a:xfrm>
-            <a:off x="7575188" y="6248400"/>
-            <a:ext cx="1461656" cy="609600"/>
-          </a:xfrm>
-          <a:prstGeom prst="rect">
-            <a:avLst/>
-          </a:prstGeom>
-        </p:spPr>
-      </p:pic>
       <p:pic>
         <p:nvPicPr>
           <p:cNvPr id="5122" name="Picture 2"/>
@@ -7640,7 +7615,7 @@
           <p:nvPr/>
         </p:nvPicPr>
         <p:blipFill>
-          <a:blip r:embed="rId3">
+          <a:blip r:embed="rId2">
             <a:extLst>
               <a:ext uri="{28A0092B-C50C-407E-A947-70E740481C1C}">
                 <a14:useLocalDpi xmlns:a14="http://schemas.microsoft.com/office/drawing/2010/main" val="0"/>
@@ -7654,8 +7629,8 @@
         </p:blipFill>
         <p:spPr bwMode="auto">
           <a:xfrm>
-            <a:off x="1457325" y="1295400"/>
-            <a:ext cx="6229350" cy="4829175"/>
+            <a:off x="803243" y="762000"/>
+            <a:ext cx="7537514" cy="5843302"/>
           </a:xfrm>
           <a:prstGeom prst="rect">
             <a:avLst/>
@@ -7683,6 +7658,36 @@
               </a14:hiddenLine>
             </a:ext>
           </a:extLst>
+        </p:spPr>
+      </p:pic>
+      <p:pic>
+        <p:nvPicPr>
+          <p:cNvPr id="10" name="Picture 9"/>
+          <p:cNvPicPr>
+            <a:picLocks noChangeAspect="1"/>
+          </p:cNvPicPr>
+          <p:nvPr/>
+        </p:nvPicPr>
+        <p:blipFill>
+          <a:blip r:embed="rId3">
+            <a:extLst>
+              <a:ext uri="{28A0092B-C50C-407E-A947-70E740481C1C}">
+                <a14:useLocalDpi xmlns:a14="http://schemas.microsoft.com/office/drawing/2010/main" val="0"/>
+              </a:ext>
+            </a:extLst>
+          </a:blip>
+          <a:stretch>
+            <a:fillRect/>
+          </a:stretch>
+        </p:blipFill>
+        <p:spPr>
+          <a:xfrm>
+            <a:off x="7575188" y="6248400"/>
+            <a:ext cx="1461656" cy="609600"/>
+          </a:xfrm>
+          <a:prstGeom prst="rect">
+            <a:avLst/>
+          </a:prstGeom>
         </p:spPr>
       </p:pic>
     </p:spTree>
@@ -8217,7 +8222,12 @@
             <p:ph type="title"/>
           </p:nvPr>
         </p:nvSpPr>
-        <p:spPr/>
+        <p:spPr>
+          <a:xfrm>
+            <a:off x="457200" y="-304800"/>
+            <a:ext cx="8229600" cy="1143000"/>
+          </a:xfrm>
+        </p:spPr>
         <p:txBody>
           <a:bodyPr>
             <a:normAutofit/>
@@ -8256,36 +8266,6 @@
           </a:p>
         </p:txBody>
       </p:sp>
-      <p:pic>
-        <p:nvPicPr>
-          <p:cNvPr id="10" name="Picture 9"/>
-          <p:cNvPicPr>
-            <a:picLocks noChangeAspect="1"/>
-          </p:cNvPicPr>
-          <p:nvPr/>
-        </p:nvPicPr>
-        <p:blipFill>
-          <a:blip r:embed="rId2">
-            <a:extLst>
-              <a:ext uri="{28A0092B-C50C-407E-A947-70E740481C1C}">
-                <a14:useLocalDpi xmlns:a14="http://schemas.microsoft.com/office/drawing/2010/main" val="0"/>
-              </a:ext>
-            </a:extLst>
-          </a:blip>
-          <a:stretch>
-            <a:fillRect/>
-          </a:stretch>
-        </p:blipFill>
-        <p:spPr>
-          <a:xfrm>
-            <a:off x="7575188" y="6248400"/>
-            <a:ext cx="1461656" cy="609600"/>
-          </a:xfrm>
-          <a:prstGeom prst="rect">
-            <a:avLst/>
-          </a:prstGeom>
-        </p:spPr>
-      </p:pic>
       <p:pic>
         <p:nvPicPr>
           <p:cNvPr id="4098" name="Picture 2"/>
@@ -8295,7 +8275,7 @@
           <p:nvPr/>
         </p:nvPicPr>
         <p:blipFill>
-          <a:blip r:embed="rId3">
+          <a:blip r:embed="rId2">
             <a:extLst>
               <a:ext uri="{28A0092B-C50C-407E-A947-70E740481C1C}">
                 <a14:useLocalDpi xmlns:a14="http://schemas.microsoft.com/office/drawing/2010/main" val="0"/>
@@ -8309,8 +8289,8 @@
         </p:blipFill>
         <p:spPr bwMode="auto">
           <a:xfrm>
-            <a:off x="1343605" y="1226499"/>
-            <a:ext cx="6456791" cy="5250501"/>
+            <a:off x="665642" y="581094"/>
+            <a:ext cx="7812717" cy="6353106"/>
           </a:xfrm>
           <a:prstGeom prst="rect">
             <a:avLst/>
@@ -8338,6 +8318,36 @@
               </a14:hiddenLine>
             </a:ext>
           </a:extLst>
+        </p:spPr>
+      </p:pic>
+      <p:pic>
+        <p:nvPicPr>
+          <p:cNvPr id="10" name="Picture 9"/>
+          <p:cNvPicPr>
+            <a:picLocks noChangeAspect="1"/>
+          </p:cNvPicPr>
+          <p:nvPr/>
+        </p:nvPicPr>
+        <p:blipFill>
+          <a:blip r:embed="rId3">
+            <a:extLst>
+              <a:ext uri="{28A0092B-C50C-407E-A947-70E740481C1C}">
+                <a14:useLocalDpi xmlns:a14="http://schemas.microsoft.com/office/drawing/2010/main" val="0"/>
+              </a:ext>
+            </a:extLst>
+          </a:blip>
+          <a:stretch>
+            <a:fillRect/>
+          </a:stretch>
+        </p:blipFill>
+        <p:spPr>
+          <a:xfrm>
+            <a:off x="7575188" y="6248400"/>
+            <a:ext cx="1461656" cy="609600"/>
+          </a:xfrm>
+          <a:prstGeom prst="rect">
+            <a:avLst/>
+          </a:prstGeom>
         </p:spPr>
       </p:pic>
     </p:spTree>

</xml_diff>

<commit_message>
fix: __dirname__ -> __dirname
</commit_message>
<xml_diff>
--- a/nodejs intro to express.pptx
+++ b/nodejs intro to express.pptx
@@ -136,6 +136,22 @@
       </a:defRPr>
     </a:lvl9pPr>
   </p:defaultTextStyle>
+  <p:extLst>
+    <p:ext uri="{EFAFB233-063F-42B5-8137-9DF3F51BA10A}">
+      <p15:sldGuideLst xmlns:p15="http://schemas.microsoft.com/office/powerpoint/2012/main">
+        <p15:guide id="1" orient="horz" pos="2160">
+          <p15:clr>
+            <a:srgbClr val="A4A3A4"/>
+          </p15:clr>
+        </p15:guide>
+        <p15:guide id="2" pos="2880">
+          <p15:clr>
+            <a:srgbClr val="A4A3A4"/>
+          </p15:clr>
+        </p15:guide>
+      </p15:sldGuideLst>
+    </p:ext>
+  </p:extLst>
 </p:presentation>
 </file>
 
@@ -221,7 +237,7 @@
           <a:p>
             <a:fld id="{E843B134-FC3F-4215-BD54-639A1EEA8DA6}" type="datetimeFigureOut">
               <a:rPr lang="en-US" smtClean="0"/>
-              <a:t>3/1/2017</a:t>
+              <a:t>4/27/2017</a:t>
             </a:fld>
             <a:endParaRPr lang="en-US"/>
           </a:p>
@@ -754,7 +770,7 @@
           <a:p>
             <a:fld id="{75A3C5B4-6199-4031-B143-8199622DDC1A}" type="datetimeFigureOut">
               <a:rPr lang="en-US" smtClean="0"/>
-              <a:t>3/1/2017</a:t>
+              <a:t>4/27/2017</a:t>
             </a:fld>
             <a:endParaRPr lang="en-US"/>
           </a:p>
@@ -924,7 +940,7 @@
           <a:p>
             <a:fld id="{75A3C5B4-6199-4031-B143-8199622DDC1A}" type="datetimeFigureOut">
               <a:rPr lang="en-US" smtClean="0"/>
-              <a:t>3/1/2017</a:t>
+              <a:t>4/27/2017</a:t>
             </a:fld>
             <a:endParaRPr lang="en-US"/>
           </a:p>
@@ -1104,7 +1120,7 @@
           <a:p>
             <a:fld id="{75A3C5B4-6199-4031-B143-8199622DDC1A}" type="datetimeFigureOut">
               <a:rPr lang="en-US" smtClean="0"/>
-              <a:t>3/1/2017</a:t>
+              <a:t>4/27/2017</a:t>
             </a:fld>
             <a:endParaRPr lang="en-US"/>
           </a:p>
@@ -1274,7 +1290,7 @@
           <a:p>
             <a:fld id="{75A3C5B4-6199-4031-B143-8199622DDC1A}" type="datetimeFigureOut">
               <a:rPr lang="en-US" smtClean="0"/>
-              <a:t>3/1/2017</a:t>
+              <a:t>4/27/2017</a:t>
             </a:fld>
             <a:endParaRPr lang="en-US"/>
           </a:p>
@@ -1520,7 +1536,7 @@
           <a:p>
             <a:fld id="{75A3C5B4-6199-4031-B143-8199622DDC1A}" type="datetimeFigureOut">
               <a:rPr lang="en-US" smtClean="0"/>
-              <a:t>3/1/2017</a:t>
+              <a:t>4/27/2017</a:t>
             </a:fld>
             <a:endParaRPr lang="en-US"/>
           </a:p>
@@ -1808,7 +1824,7 @@
           <a:p>
             <a:fld id="{75A3C5B4-6199-4031-B143-8199622DDC1A}" type="datetimeFigureOut">
               <a:rPr lang="en-US" smtClean="0"/>
-              <a:t>3/1/2017</a:t>
+              <a:t>4/27/2017</a:t>
             </a:fld>
             <a:endParaRPr lang="en-US"/>
           </a:p>
@@ -2230,7 +2246,7 @@
           <a:p>
             <a:fld id="{75A3C5B4-6199-4031-B143-8199622DDC1A}" type="datetimeFigureOut">
               <a:rPr lang="en-US" smtClean="0"/>
-              <a:t>3/1/2017</a:t>
+              <a:t>4/27/2017</a:t>
             </a:fld>
             <a:endParaRPr lang="en-US"/>
           </a:p>
@@ -2348,7 +2364,7 @@
           <a:p>
             <a:fld id="{75A3C5B4-6199-4031-B143-8199622DDC1A}" type="datetimeFigureOut">
               <a:rPr lang="en-US" smtClean="0"/>
-              <a:t>3/1/2017</a:t>
+              <a:t>4/27/2017</a:t>
             </a:fld>
             <a:endParaRPr lang="en-US"/>
           </a:p>
@@ -2443,7 +2459,7 @@
           <a:p>
             <a:fld id="{75A3C5B4-6199-4031-B143-8199622DDC1A}" type="datetimeFigureOut">
               <a:rPr lang="en-US" smtClean="0"/>
-              <a:t>3/1/2017</a:t>
+              <a:t>4/27/2017</a:t>
             </a:fld>
             <a:endParaRPr lang="en-US"/>
           </a:p>
@@ -2720,7 +2736,7 @@
           <a:p>
             <a:fld id="{75A3C5B4-6199-4031-B143-8199622DDC1A}" type="datetimeFigureOut">
               <a:rPr lang="en-US" smtClean="0"/>
-              <a:t>3/1/2017</a:t>
+              <a:t>4/27/2017</a:t>
             </a:fld>
             <a:endParaRPr lang="en-US"/>
           </a:p>
@@ -2973,7 +2989,7 @@
           <a:p>
             <a:fld id="{75A3C5B4-6199-4031-B143-8199622DDC1A}" type="datetimeFigureOut">
               <a:rPr lang="en-US" smtClean="0"/>
-              <a:t>3/1/2017</a:t>
+              <a:t>4/27/2017</a:t>
             </a:fld>
             <a:endParaRPr lang="en-US"/>
           </a:p>
@@ -3186,7 +3202,7 @@
           <a:p>
             <a:fld id="{75A3C5B4-6199-4031-B143-8199622DDC1A}" type="datetimeFigureOut">
               <a:rPr lang="en-US" smtClean="0"/>
-              <a:t>3/1/2017</a:t>
+              <a:t>4/27/2017</a:t>
             </a:fld>
             <a:endParaRPr lang="en-US"/>
           </a:p>
@@ -7121,56 +7137,26 @@
       </p:pic>
       <p:pic>
         <p:nvPicPr>
-          <p:cNvPr id="3075" name="Picture 3"/>
+          <p:cNvPr id="3" name="Picture 2"/>
           <p:cNvPicPr>
-            <a:picLocks noChangeAspect="1" noChangeArrowheads="1"/>
+            <a:picLocks noChangeAspect="1"/>
           </p:cNvPicPr>
           <p:nvPr/>
         </p:nvPicPr>
         <p:blipFill>
-          <a:blip r:embed="rId3">
-            <a:extLst>
-              <a:ext uri="{28A0092B-C50C-407E-A947-70E740481C1C}">
-                <a14:useLocalDpi xmlns:a14="http://schemas.microsoft.com/office/drawing/2010/main" val="0"/>
-              </a:ext>
-            </a:extLst>
-          </a:blip>
-          <a:srcRect/>
+          <a:blip r:embed="rId3"/>
           <a:stretch>
             <a:fillRect/>
           </a:stretch>
         </p:blipFill>
-        <p:spPr bwMode="auto">
-          <a:xfrm>
-            <a:off x="481013" y="2614613"/>
-            <a:ext cx="8181975" cy="1628775"/>
+        <p:spPr>
+          <a:xfrm>
+            <a:off x="214312" y="2538412"/>
+            <a:ext cx="8715375" cy="1781175"/>
           </a:xfrm>
           <a:prstGeom prst="rect">
             <a:avLst/>
           </a:prstGeom>
-          <a:noFill/>
-          <a:ln>
-            <a:noFill/>
-          </a:ln>
-          <a:extLst>
-            <a:ext uri="{909E8E84-426E-40DD-AFC4-6F175D3DCCD1}">
-              <a14:hiddenFill xmlns:a14="http://schemas.microsoft.com/office/drawing/2010/main">
-                <a:solidFill>
-                  <a:schemeClr val="accent1"/>
-                </a:solidFill>
-              </a14:hiddenFill>
-            </a:ext>
-            <a:ext uri="{91240B29-F687-4F45-9708-019B960494DF}">
-              <a14:hiddenLine xmlns:a14="http://schemas.microsoft.com/office/drawing/2010/main" w="9525">
-                <a:solidFill>
-                  <a:schemeClr val="tx1"/>
-                </a:solidFill>
-                <a:miter lim="800000"/>
-                <a:headEnd/>
-                <a:tailEnd/>
-              </a14:hiddenLine>
-            </a:ext>
-          </a:extLst>
         </p:spPr>
       </p:pic>
     </p:spTree>

</xml_diff>